<commit_message>
added chat app js functionality (for showing message)
</commit_message>
<xml_diff>
--- a/03. Git & Github/Github.pptx
+++ b/03. Git & Github/Github.pptx
@@ -247,7 +247,7 @@
           <a:p>
             <a:fld id="{AD890F14-D9B7-42F0-8464-D3AF2629EBA3}" type="datetimeFigureOut">
               <a:rPr lang="en-US" smtClean="0"/>
-              <a:t>4/23/2021</a:t>
+              <a:t>4/25/2021</a:t>
             </a:fld>
             <a:endParaRPr lang="en-US"/>
           </a:p>
@@ -1489,7 +1489,7 @@
           </a:lstStyle>
           <a:p>
             <a:r>
-              <a:rPr lang="en-US" smtClean="0"/>
+              <a:rPr lang="en-US"/>
               <a:t>Click to edit Master title style</a:t>
             </a:r>
             <a:endParaRPr lang="en-US" dirty="0"/>
@@ -1609,7 +1609,7 @@
           </a:lstStyle>
           <a:p>
             <a:r>
-              <a:rPr lang="en-US" smtClean="0"/>
+              <a:rPr lang="en-US"/>
               <a:t>Click to edit Master subtitle style</a:t>
             </a:r>
             <a:endParaRPr lang="en-US" dirty="0"/>
@@ -1633,7 +1633,7 @@
           <a:p>
             <a:fld id="{4079FD93-08D1-3D47-8B88-9F159745C9D8}" type="datetimeFigureOut">
               <a:rPr lang="en-US" smtClean="0"/>
-              <a:t>4/23/2021</a:t>
+              <a:t>4/25/2021</a:t>
             </a:fld>
             <a:endParaRPr lang="en-US"/>
           </a:p>
@@ -1703,13 +1703,6 @@
       </p:transition>
     </mc:Fallback>
   </mc:AlternateContent>
-  <p:timing>
-    <p:tnLst>
-      <p:par>
-        <p:cTn id="1" dur="indefinite" restart="never" nodeType="tmRoot"/>
-      </p:par>
-    </p:tnLst>
-  </p:timing>
 </p:sldLayout>
 </file>
 
@@ -1757,7 +1750,7 @@
           </a:lstStyle>
           <a:p>
             <a:r>
-              <a:rPr lang="en-US" smtClean="0"/>
+              <a:rPr lang="en-US"/>
               <a:t>Click to edit Master title style</a:t>
             </a:r>
             <a:endParaRPr lang="en-US" dirty="0"/>
@@ -1880,7 +1873,7 @@
           <a:p>
             <a:pPr lvl="0"/>
             <a:r>
-              <a:rPr lang="en-US" smtClean="0"/>
+              <a:rPr lang="en-US"/>
               <a:t>Edit Master text styles</a:t>
             </a:r>
           </a:p>
@@ -1903,7 +1896,7 @@
           <a:p>
             <a:fld id="{4079FD93-08D1-3D47-8B88-9F159745C9D8}" type="datetimeFigureOut">
               <a:rPr lang="en-US" smtClean="0"/>
-              <a:t>4/23/2021</a:t>
+              <a:t>4/25/2021</a:t>
             </a:fld>
             <a:endParaRPr lang="en-US"/>
           </a:p>
@@ -1961,13 +1954,6 @@
   <p:clrMapOvr>
     <a:masterClrMapping/>
   </p:clrMapOvr>
-  <p:timing>
-    <p:tnLst>
-      <p:par>
-        <p:cTn id="1" dur="indefinite" restart="never" nodeType="tmRoot"/>
-      </p:par>
-    </p:tnLst>
-  </p:timing>
 </p:sldLayout>
 </file>
 
@@ -2015,7 +2001,7 @@
           </a:lstStyle>
           <a:p>
             <a:r>
-              <a:rPr lang="en-US" smtClean="0"/>
+              <a:rPr lang="en-US"/>
               <a:t>Click to edit Master title style</a:t>
             </a:r>
             <a:endParaRPr lang="en-US" dirty="0"/>
@@ -2079,7 +2065,7 @@
           <a:p>
             <a:pPr lvl="0"/>
             <a:r>
-              <a:rPr lang="en-US" smtClean="0"/>
+              <a:rPr lang="en-US"/>
               <a:t>Edit Master text styles</a:t>
             </a:r>
           </a:p>
@@ -2201,7 +2187,7 @@
           <a:p>
             <a:pPr lvl="0"/>
             <a:r>
-              <a:rPr lang="en-US" smtClean="0"/>
+              <a:rPr lang="en-US"/>
               <a:t>Edit Master text styles</a:t>
             </a:r>
           </a:p>
@@ -2224,7 +2210,7 @@
           <a:p>
             <a:fld id="{4079FD93-08D1-3D47-8B88-9F159745C9D8}" type="datetimeFigureOut">
               <a:rPr lang="en-US" smtClean="0"/>
-              <a:t>4/23/2021</a:t>
+              <a:t>4/25/2021</a:t>
             </a:fld>
             <a:endParaRPr lang="en-US"/>
           </a:p>
@@ -2358,13 +2344,6 @@
   <p:clrMapOvr>
     <a:masterClrMapping/>
   </p:clrMapOvr>
-  <p:timing>
-    <p:tnLst>
-      <p:par>
-        <p:cTn id="1" dur="indefinite" restart="never" nodeType="tmRoot"/>
-      </p:par>
-    </p:tnLst>
-  </p:timing>
 </p:sldLayout>
 </file>
 
@@ -2412,7 +2391,7 @@
           </a:lstStyle>
           <a:p>
             <a:r>
-              <a:rPr lang="en-US" smtClean="0"/>
+              <a:rPr lang="en-US"/>
               <a:t>Click to edit Master title style</a:t>
             </a:r>
             <a:endParaRPr lang="en-US" dirty="0"/>
@@ -2535,7 +2514,7 @@
           <a:p>
             <a:pPr lvl="0"/>
             <a:r>
-              <a:rPr lang="en-US" smtClean="0"/>
+              <a:rPr lang="en-US"/>
               <a:t>Edit Master text styles</a:t>
             </a:r>
           </a:p>
@@ -2558,7 +2537,7 @@
           <a:p>
             <a:fld id="{4079FD93-08D1-3D47-8B88-9F159745C9D8}" type="datetimeFigureOut">
               <a:rPr lang="en-US" smtClean="0"/>
-              <a:t>4/23/2021</a:t>
+              <a:t>4/25/2021</a:t>
             </a:fld>
             <a:endParaRPr lang="en-US"/>
           </a:p>
@@ -2616,13 +2595,6 @@
   <p:clrMapOvr>
     <a:masterClrMapping/>
   </p:clrMapOvr>
-  <p:timing>
-    <p:tnLst>
-      <p:par>
-        <p:cTn id="1" dur="indefinite" restart="never" nodeType="tmRoot"/>
-      </p:par>
-    </p:tnLst>
-  </p:timing>
 </p:sldLayout>
 </file>
 
@@ -2670,7 +2642,7 @@
           </a:lstStyle>
           <a:p>
             <a:r>
-              <a:rPr lang="en-US" smtClean="0"/>
+              <a:rPr lang="en-US"/>
               <a:t>Click to edit Master title style</a:t>
             </a:r>
             <a:endParaRPr lang="en-US" dirty="0"/>
@@ -2734,7 +2706,7 @@
           <a:p>
             <a:pPr lvl="0"/>
             <a:r>
-              <a:rPr lang="en-US" smtClean="0"/>
+              <a:rPr lang="en-US"/>
               <a:t>Edit Master text styles</a:t>
             </a:r>
           </a:p>
@@ -2856,7 +2828,7 @@
           <a:p>
             <a:pPr lvl="0"/>
             <a:r>
-              <a:rPr lang="en-US" smtClean="0"/>
+              <a:rPr lang="en-US"/>
               <a:t>Edit Master text styles</a:t>
             </a:r>
           </a:p>
@@ -2879,7 +2851,7 @@
           <a:p>
             <a:fld id="{4079FD93-08D1-3D47-8B88-9F159745C9D8}" type="datetimeFigureOut">
               <a:rPr lang="en-US" smtClean="0"/>
-              <a:t>4/23/2021</a:t>
+              <a:t>4/25/2021</a:t>
             </a:fld>
             <a:endParaRPr lang="en-US"/>
           </a:p>
@@ -3013,13 +2985,6 @@
   <p:clrMapOvr>
     <a:masterClrMapping/>
   </p:clrMapOvr>
-  <p:timing>
-    <p:tnLst>
-      <p:par>
-        <p:cTn id="1" dur="indefinite" restart="never" nodeType="tmRoot"/>
-      </p:par>
-    </p:tnLst>
-  </p:timing>
 </p:sldLayout>
 </file>
 
@@ -3067,7 +3032,7 @@
           </a:lstStyle>
           <a:p>
             <a:r>
-              <a:rPr lang="en-US" smtClean="0"/>
+              <a:rPr lang="en-US"/>
               <a:t>Click to edit Master title style</a:t>
             </a:r>
             <a:endParaRPr lang="en-US" dirty="0"/>
@@ -3128,7 +3093,7 @@
           <a:p>
             <a:pPr lvl="0"/>
             <a:r>
-              <a:rPr lang="en-US" smtClean="0"/>
+              <a:rPr lang="en-US"/>
               <a:t>Edit Master text styles</a:t>
             </a:r>
           </a:p>
@@ -3250,7 +3215,7 @@
           <a:p>
             <a:pPr lvl="0"/>
             <a:r>
-              <a:rPr lang="en-US" smtClean="0"/>
+              <a:rPr lang="en-US"/>
               <a:t>Edit Master text styles</a:t>
             </a:r>
           </a:p>
@@ -3273,7 +3238,7 @@
           <a:p>
             <a:fld id="{4079FD93-08D1-3D47-8B88-9F159745C9D8}" type="datetimeFigureOut">
               <a:rPr lang="en-US" smtClean="0"/>
-              <a:t>4/23/2021</a:t>
+              <a:t>4/25/2021</a:t>
             </a:fld>
             <a:endParaRPr lang="en-US"/>
           </a:p>
@@ -3331,13 +3296,6 @@
   <p:clrMapOvr>
     <a:masterClrMapping/>
   </p:clrMapOvr>
-  <p:timing>
-    <p:tnLst>
-      <p:par>
-        <p:cTn id="1" dur="indefinite" restart="never" nodeType="tmRoot"/>
-      </p:par>
-    </p:tnLst>
-  </p:timing>
 </p:sldLayout>
 </file>
 
@@ -3374,7 +3332,7 @@
           <a:lstStyle/>
           <a:p>
             <a:r>
-              <a:rPr lang="en-US" smtClean="0"/>
+              <a:rPr lang="en-US"/>
               <a:t>Click to edit Master title style</a:t>
             </a:r>
             <a:endParaRPr lang="en-US" dirty="0"/>
@@ -3398,35 +3356,35 @@
           <a:p>
             <a:pPr lvl="0"/>
             <a:r>
-              <a:rPr lang="en-US" smtClean="0"/>
+              <a:rPr lang="en-US"/>
               <a:t>Edit Master text styles</a:t>
             </a:r>
           </a:p>
           <a:p>
             <a:pPr lvl="1"/>
             <a:r>
-              <a:rPr lang="en-US" smtClean="0"/>
+              <a:rPr lang="en-US"/>
               <a:t>Second level</a:t>
             </a:r>
           </a:p>
           <a:p>
             <a:pPr lvl="2"/>
             <a:r>
-              <a:rPr lang="en-US" smtClean="0"/>
+              <a:rPr lang="en-US"/>
               <a:t>Third level</a:t>
             </a:r>
           </a:p>
           <a:p>
             <a:pPr lvl="3"/>
             <a:r>
-              <a:rPr lang="en-US" smtClean="0"/>
+              <a:rPr lang="en-US"/>
               <a:t>Fourth level</a:t>
             </a:r>
           </a:p>
           <a:p>
             <a:pPr lvl="4"/>
             <a:r>
-              <a:rPr lang="en-US" smtClean="0"/>
+              <a:rPr lang="en-US"/>
               <a:t>Fifth level</a:t>
             </a:r>
             <a:endParaRPr lang="en-US" dirty="0"/>
@@ -3450,7 +3408,7 @@
           <a:p>
             <a:fld id="{4079FD93-08D1-3D47-8B88-9F159745C9D8}" type="datetimeFigureOut">
               <a:rPr lang="en-US" smtClean="0"/>
-              <a:t>4/23/2021</a:t>
+              <a:t>4/25/2021</a:t>
             </a:fld>
             <a:endParaRPr lang="en-US"/>
           </a:p>
@@ -3508,13 +3466,6 @@
   <p:clrMapOvr>
     <a:masterClrMapping/>
   </p:clrMapOvr>
-  <p:timing>
-    <p:tnLst>
-      <p:par>
-        <p:cTn id="1" dur="indefinite" restart="never" nodeType="tmRoot"/>
-      </p:par>
-    </p:tnLst>
-  </p:timing>
 </p:sldLayout>
 </file>
 
@@ -3556,7 +3507,7 @@
           <a:lstStyle/>
           <a:p>
             <a:r>
-              <a:rPr lang="en-US" smtClean="0"/>
+              <a:rPr lang="en-US"/>
               <a:t>Click to edit Master title style</a:t>
             </a:r>
             <a:endParaRPr lang="en-US" dirty="0"/>
@@ -3585,35 +3536,35 @@
           <a:p>
             <a:pPr lvl="0"/>
             <a:r>
-              <a:rPr lang="en-US" smtClean="0"/>
+              <a:rPr lang="en-US"/>
               <a:t>Edit Master text styles</a:t>
             </a:r>
           </a:p>
           <a:p>
             <a:pPr lvl="1"/>
             <a:r>
-              <a:rPr lang="en-US" smtClean="0"/>
+              <a:rPr lang="en-US"/>
               <a:t>Second level</a:t>
             </a:r>
           </a:p>
           <a:p>
             <a:pPr lvl="2"/>
             <a:r>
-              <a:rPr lang="en-US" smtClean="0"/>
+              <a:rPr lang="en-US"/>
               <a:t>Third level</a:t>
             </a:r>
           </a:p>
           <a:p>
             <a:pPr lvl="3"/>
             <a:r>
-              <a:rPr lang="en-US" smtClean="0"/>
+              <a:rPr lang="en-US"/>
               <a:t>Fourth level</a:t>
             </a:r>
           </a:p>
           <a:p>
             <a:pPr lvl="4"/>
             <a:r>
-              <a:rPr lang="en-US" smtClean="0"/>
+              <a:rPr lang="en-US"/>
               <a:t>Fifth level</a:t>
             </a:r>
             <a:endParaRPr lang="en-US" dirty="0"/>
@@ -3637,7 +3588,7 @@
           <a:p>
             <a:fld id="{4079FD93-08D1-3D47-8B88-9F159745C9D8}" type="datetimeFigureOut">
               <a:rPr lang="en-US" smtClean="0"/>
-              <a:t>4/23/2021</a:t>
+              <a:t>4/25/2021</a:t>
             </a:fld>
             <a:endParaRPr lang="en-US"/>
           </a:p>
@@ -3695,13 +3646,6 @@
   <p:clrMapOvr>
     <a:masterClrMapping/>
   </p:clrMapOvr>
-  <p:timing>
-    <p:tnLst>
-      <p:par>
-        <p:cTn id="1" dur="indefinite" restart="never" nodeType="tmRoot"/>
-      </p:par>
-    </p:tnLst>
-  </p:timing>
 </p:sldLayout>
 </file>
 
@@ -3936,7 +3880,7 @@
           </a:lstStyle>
           <a:p>
             <a:r>
-              <a:rPr lang="en-US" smtClean="0"/>
+              <a:rPr lang="en-US"/>
               <a:t>Click to edit Master title style</a:t>
             </a:r>
             <a:endParaRPr lang="en-US" dirty="0"/>
@@ -3960,35 +3904,35 @@
           <a:p>
             <a:pPr lvl="0"/>
             <a:r>
-              <a:rPr lang="en-US" smtClean="0"/>
+              <a:rPr lang="en-US"/>
               <a:t>Edit Master text styles</a:t>
             </a:r>
           </a:p>
           <a:p>
             <a:pPr lvl="1"/>
             <a:r>
-              <a:rPr lang="en-US" smtClean="0"/>
+              <a:rPr lang="en-US"/>
               <a:t>Second level</a:t>
             </a:r>
           </a:p>
           <a:p>
             <a:pPr lvl="2"/>
             <a:r>
-              <a:rPr lang="en-US" smtClean="0"/>
+              <a:rPr lang="en-US"/>
               <a:t>Third level</a:t>
             </a:r>
           </a:p>
           <a:p>
             <a:pPr lvl="3"/>
             <a:r>
-              <a:rPr lang="en-US" smtClean="0"/>
+              <a:rPr lang="en-US"/>
               <a:t>Fourth level</a:t>
             </a:r>
           </a:p>
           <a:p>
             <a:pPr lvl="4"/>
             <a:r>
-              <a:rPr lang="en-US" smtClean="0"/>
+              <a:rPr lang="en-US"/>
               <a:t>Fifth level</a:t>
             </a:r>
             <a:endParaRPr lang="en-US" dirty="0"/>
@@ -4020,7 +3964,7 @@
                 <a:latin typeface="Segoe UI"/>
               </a:rPr>
               <a:pPr/>
-              <a:t>4/23/2021</a:t>
+              <a:t>4/25/2021</a:t>
             </a:fld>
             <a:endParaRPr lang="en-US">
               <a:solidFill>
@@ -4119,13 +4063,6 @@
       </p:transition>
     </mc:Fallback>
   </mc:AlternateContent>
-  <p:timing>
-    <p:tnLst>
-      <p:par>
-        <p:cTn id="1" dur="indefinite" restart="never" nodeType="tmRoot"/>
-      </p:par>
-    </p:tnLst>
-  </p:timing>
 </p:sldLayout>
 </file>
 
@@ -4171,7 +4108,7 @@
           </a:lstStyle>
           <a:p>
             <a:r>
-              <a:rPr lang="en-US" smtClean="0"/>
+              <a:rPr lang="en-US"/>
               <a:t>Click to edit Master title style</a:t>
             </a:r>
             <a:endParaRPr lang="en-US" dirty="0"/>
@@ -4292,7 +4229,7 @@
           <a:p>
             <a:pPr lvl="0"/>
             <a:r>
-              <a:rPr lang="en-US" smtClean="0"/>
+              <a:rPr lang="en-US"/>
               <a:t>Edit Master text styles</a:t>
             </a:r>
           </a:p>
@@ -4315,7 +4252,7 @@
           <a:p>
             <a:fld id="{4079FD93-08D1-3D47-8B88-9F159745C9D8}" type="datetimeFigureOut">
               <a:rPr lang="en-US" smtClean="0"/>
-              <a:t>4/23/2021</a:t>
+              <a:t>4/25/2021</a:t>
             </a:fld>
             <a:endParaRPr lang="en-US"/>
           </a:p>
@@ -4373,13 +4310,6 @@
   <p:clrMapOvr>
     <a:masterClrMapping/>
   </p:clrMapOvr>
-  <p:timing>
-    <p:tnLst>
-      <p:par>
-        <p:cTn id="1" dur="indefinite" restart="never" nodeType="tmRoot"/>
-      </p:par>
-    </p:tnLst>
-  </p:timing>
 </p:sldLayout>
 </file>
 
@@ -4416,7 +4346,7 @@
           <a:lstStyle/>
           <a:p>
             <a:r>
-              <a:rPr lang="en-US" smtClean="0"/>
+              <a:rPr lang="en-US"/>
               <a:t>Click to edit Master title style</a:t>
             </a:r>
             <a:endParaRPr lang="en-US" dirty="0"/>
@@ -4445,35 +4375,35 @@
           <a:p>
             <a:pPr lvl="0"/>
             <a:r>
-              <a:rPr lang="en-US" smtClean="0"/>
+              <a:rPr lang="en-US"/>
               <a:t>Edit Master text styles</a:t>
             </a:r>
           </a:p>
           <a:p>
             <a:pPr lvl="1"/>
             <a:r>
-              <a:rPr lang="en-US" smtClean="0"/>
+              <a:rPr lang="en-US"/>
               <a:t>Second level</a:t>
             </a:r>
           </a:p>
           <a:p>
             <a:pPr lvl="2"/>
             <a:r>
-              <a:rPr lang="en-US" smtClean="0"/>
+              <a:rPr lang="en-US"/>
               <a:t>Third level</a:t>
             </a:r>
           </a:p>
           <a:p>
             <a:pPr lvl="3"/>
             <a:r>
-              <a:rPr lang="en-US" smtClean="0"/>
+              <a:rPr lang="en-US"/>
               <a:t>Fourth level</a:t>
             </a:r>
           </a:p>
           <a:p>
             <a:pPr lvl="4"/>
             <a:r>
-              <a:rPr lang="en-US" smtClean="0"/>
+              <a:rPr lang="en-US"/>
               <a:t>Fifth level</a:t>
             </a:r>
             <a:endParaRPr lang="en-US" dirty="0"/>
@@ -4502,35 +4432,35 @@
           <a:p>
             <a:pPr lvl="0"/>
             <a:r>
-              <a:rPr lang="en-US" smtClean="0"/>
+              <a:rPr lang="en-US"/>
               <a:t>Edit Master text styles</a:t>
             </a:r>
           </a:p>
           <a:p>
             <a:pPr lvl="1"/>
             <a:r>
-              <a:rPr lang="en-US" smtClean="0"/>
+              <a:rPr lang="en-US"/>
               <a:t>Second level</a:t>
             </a:r>
           </a:p>
           <a:p>
             <a:pPr lvl="2"/>
             <a:r>
-              <a:rPr lang="en-US" smtClean="0"/>
+              <a:rPr lang="en-US"/>
               <a:t>Third level</a:t>
             </a:r>
           </a:p>
           <a:p>
             <a:pPr lvl="3"/>
             <a:r>
-              <a:rPr lang="en-US" smtClean="0"/>
+              <a:rPr lang="en-US"/>
               <a:t>Fourth level</a:t>
             </a:r>
           </a:p>
           <a:p>
             <a:pPr lvl="4"/>
             <a:r>
-              <a:rPr lang="en-US" smtClean="0"/>
+              <a:rPr lang="en-US"/>
               <a:t>Fifth level</a:t>
             </a:r>
             <a:endParaRPr lang="en-US" dirty="0"/>
@@ -4562,7 +4492,7 @@
                 <a:latin typeface="Segoe UI"/>
               </a:rPr>
               <a:pPr/>
-              <a:t>4/23/2021</a:t>
+              <a:t>4/25/2021</a:t>
             </a:fld>
             <a:endParaRPr lang="en-US">
               <a:solidFill>
@@ -4661,13 +4591,6 @@
       </p:transition>
     </mc:Fallback>
   </mc:AlternateContent>
-  <p:timing>
-    <p:tnLst>
-      <p:par>
-        <p:cTn id="1" dur="indefinite" restart="never" nodeType="tmRoot"/>
-      </p:par>
-    </p:tnLst>
-  </p:timing>
 </p:sldLayout>
 </file>
 
@@ -4708,7 +4631,7 @@
           </a:lstStyle>
           <a:p>
             <a:r>
-              <a:rPr lang="en-US" smtClean="0"/>
+              <a:rPr lang="en-US"/>
               <a:t>Click to edit Master title style</a:t>
             </a:r>
             <a:endParaRPr lang="en-US" dirty="0"/>
@@ -4776,7 +4699,7 @@
           <a:p>
             <a:pPr lvl="0"/>
             <a:r>
-              <a:rPr lang="en-US" smtClean="0"/>
+              <a:rPr lang="en-US"/>
               <a:t>Edit Master text styles</a:t>
             </a:r>
           </a:p>
@@ -4806,35 +4729,35 @@
           <a:p>
             <a:pPr lvl="0"/>
             <a:r>
-              <a:rPr lang="en-US" smtClean="0"/>
+              <a:rPr lang="en-US"/>
               <a:t>Edit Master text styles</a:t>
             </a:r>
           </a:p>
           <a:p>
             <a:pPr lvl="1"/>
             <a:r>
-              <a:rPr lang="en-US" smtClean="0"/>
+              <a:rPr lang="en-US"/>
               <a:t>Second level</a:t>
             </a:r>
           </a:p>
           <a:p>
             <a:pPr lvl="2"/>
             <a:r>
-              <a:rPr lang="en-US" smtClean="0"/>
+              <a:rPr lang="en-US"/>
               <a:t>Third level</a:t>
             </a:r>
           </a:p>
           <a:p>
             <a:pPr lvl="3"/>
             <a:r>
-              <a:rPr lang="en-US" smtClean="0"/>
+              <a:rPr lang="en-US"/>
               <a:t>Fourth level</a:t>
             </a:r>
           </a:p>
           <a:p>
             <a:pPr lvl="4"/>
             <a:r>
-              <a:rPr lang="en-US" smtClean="0"/>
+              <a:rPr lang="en-US"/>
               <a:t>Fifth level</a:t>
             </a:r>
             <a:endParaRPr lang="en-US" dirty="0"/>
@@ -4902,7 +4825,7 @@
           <a:p>
             <a:pPr lvl="0"/>
             <a:r>
-              <a:rPr lang="en-US" smtClean="0"/>
+              <a:rPr lang="en-US"/>
               <a:t>Edit Master text styles</a:t>
             </a:r>
           </a:p>
@@ -4932,35 +4855,35 @@
           <a:p>
             <a:pPr lvl="0"/>
             <a:r>
-              <a:rPr lang="en-US" smtClean="0"/>
+              <a:rPr lang="en-US"/>
               <a:t>Edit Master text styles</a:t>
             </a:r>
           </a:p>
           <a:p>
             <a:pPr lvl="1"/>
             <a:r>
-              <a:rPr lang="en-US" smtClean="0"/>
+              <a:rPr lang="en-US"/>
               <a:t>Second level</a:t>
             </a:r>
           </a:p>
           <a:p>
             <a:pPr lvl="2"/>
             <a:r>
-              <a:rPr lang="en-US" smtClean="0"/>
+              <a:rPr lang="en-US"/>
               <a:t>Third level</a:t>
             </a:r>
           </a:p>
           <a:p>
             <a:pPr lvl="3"/>
             <a:r>
-              <a:rPr lang="en-US" smtClean="0"/>
+              <a:rPr lang="en-US"/>
               <a:t>Fourth level</a:t>
             </a:r>
           </a:p>
           <a:p>
             <a:pPr lvl="4"/>
             <a:r>
-              <a:rPr lang="en-US" smtClean="0"/>
+              <a:rPr lang="en-US"/>
               <a:t>Fifth level</a:t>
             </a:r>
             <a:endParaRPr lang="en-US" dirty="0"/>
@@ -4984,7 +4907,7 @@
           <a:p>
             <a:fld id="{4079FD93-08D1-3D47-8B88-9F159745C9D8}" type="datetimeFigureOut">
               <a:rPr lang="en-US" smtClean="0"/>
-              <a:t>4/23/2021</a:t>
+              <a:t>4/25/2021</a:t>
             </a:fld>
             <a:endParaRPr lang="en-US"/>
           </a:p>
@@ -5042,13 +4965,6 @@
   <p:clrMapOvr>
     <a:masterClrMapping/>
   </p:clrMapOvr>
-  <p:timing>
-    <p:tnLst>
-      <p:par>
-        <p:cTn id="1" dur="indefinite" restart="never" nodeType="tmRoot"/>
-      </p:par>
-    </p:tnLst>
-  </p:timing>
 </p:sldLayout>
 </file>
 
@@ -5090,7 +5006,7 @@
           <a:lstStyle/>
           <a:p>
             <a:r>
-              <a:rPr lang="en-US" smtClean="0"/>
+              <a:rPr lang="en-US"/>
               <a:t>Click to edit Master title style</a:t>
             </a:r>
             <a:endParaRPr lang="en-US" dirty="0"/>
@@ -5122,7 +5038,7 @@
                 <a:latin typeface="Segoe UI"/>
               </a:rPr>
               <a:pPr/>
-              <a:t>4/23/2021</a:t>
+              <a:t>4/25/2021</a:t>
             </a:fld>
             <a:endParaRPr lang="en-US">
               <a:solidFill>
@@ -5221,13 +5137,6 @@
       </p:transition>
     </mc:Fallback>
   </mc:AlternateContent>
-  <p:timing>
-    <p:tnLst>
-      <p:par>
-        <p:cTn id="1" dur="indefinite" restart="never" nodeType="tmRoot"/>
-      </p:par>
-    </p:tnLst>
-  </p:timing>
 </p:sldLayout>
 </file>
 
@@ -5265,7 +5174,7 @@
           <a:p>
             <a:fld id="{4079FD93-08D1-3D47-8B88-9F159745C9D8}" type="datetimeFigureOut">
               <a:rPr lang="en-US" smtClean="0"/>
-              <a:t>4/23/2021</a:t>
+              <a:t>4/25/2021</a:t>
             </a:fld>
             <a:endParaRPr lang="en-US"/>
           </a:p>
@@ -5323,13 +5232,6 @@
   <p:clrMapOvr>
     <a:masterClrMapping/>
   </p:clrMapOvr>
-  <p:timing>
-    <p:tnLst>
-      <p:par>
-        <p:cTn id="1" dur="indefinite" restart="never" nodeType="tmRoot"/>
-      </p:par>
-    </p:tnLst>
-  </p:timing>
 </p:sldLayout>
 </file>
 
@@ -5377,7 +5279,7 @@
           </a:lstStyle>
           <a:p>
             <a:r>
-              <a:rPr lang="en-US" smtClean="0"/>
+              <a:rPr lang="en-US"/>
               <a:t>Click to edit Master title style</a:t>
             </a:r>
             <a:endParaRPr lang="en-US" dirty="0"/>
@@ -5408,35 +5310,35 @@
           <a:p>
             <a:pPr lvl="0"/>
             <a:r>
-              <a:rPr lang="en-US" smtClean="0"/>
+              <a:rPr lang="en-US"/>
               <a:t>Edit Master text styles</a:t>
             </a:r>
           </a:p>
           <a:p>
             <a:pPr lvl="1"/>
             <a:r>
-              <a:rPr lang="en-US" smtClean="0"/>
+              <a:rPr lang="en-US"/>
               <a:t>Second level</a:t>
             </a:r>
           </a:p>
           <a:p>
             <a:pPr lvl="2"/>
             <a:r>
-              <a:rPr lang="en-US" smtClean="0"/>
+              <a:rPr lang="en-US"/>
               <a:t>Third level</a:t>
             </a:r>
           </a:p>
           <a:p>
             <a:pPr lvl="3"/>
             <a:r>
-              <a:rPr lang="en-US" smtClean="0"/>
+              <a:rPr lang="en-US"/>
               <a:t>Fourth level</a:t>
             </a:r>
           </a:p>
           <a:p>
             <a:pPr lvl="4"/>
             <a:r>
-              <a:rPr lang="en-US" smtClean="0"/>
+              <a:rPr lang="en-US"/>
               <a:t>Fifth level</a:t>
             </a:r>
             <a:endParaRPr lang="en-US" dirty="0"/>
@@ -5504,7 +5406,7 @@
           <a:p>
             <a:pPr lvl="0"/>
             <a:r>
-              <a:rPr lang="en-US" smtClean="0"/>
+              <a:rPr lang="en-US"/>
               <a:t>Edit Master text styles</a:t>
             </a:r>
           </a:p>
@@ -5527,7 +5429,7 @@
           <a:p>
             <a:fld id="{4079FD93-08D1-3D47-8B88-9F159745C9D8}" type="datetimeFigureOut">
               <a:rPr lang="en-US" smtClean="0"/>
-              <a:t>4/23/2021</a:t>
+              <a:t>4/25/2021</a:t>
             </a:fld>
             <a:endParaRPr lang="en-US"/>
           </a:p>
@@ -5585,13 +5487,6 @@
   <p:clrMapOvr>
     <a:masterClrMapping/>
   </p:clrMapOvr>
-  <p:timing>
-    <p:tnLst>
-      <p:par>
-        <p:cTn id="1" dur="indefinite" restart="never" nodeType="tmRoot"/>
-      </p:par>
-    </p:tnLst>
-  </p:timing>
 </p:sldLayout>
 </file>
 
@@ -5639,7 +5534,7 @@
           </a:lstStyle>
           <a:p>
             <a:r>
-              <a:rPr lang="en-US" smtClean="0"/>
+              <a:rPr lang="en-US"/>
               <a:t>Click to edit Master title style</a:t>
             </a:r>
             <a:endParaRPr lang="en-US" dirty="0"/>
@@ -5706,7 +5601,7 @@
           </a:lstStyle>
           <a:p>
             <a:r>
-              <a:rPr lang="en-US" smtClean="0"/>
+              <a:rPr lang="en-US"/>
               <a:t>Click icon to add picture</a:t>
             </a:r>
             <a:endParaRPr lang="en-US" dirty="0"/>
@@ -5774,7 +5669,7 @@
           <a:p>
             <a:pPr lvl="0"/>
             <a:r>
-              <a:rPr lang="en-US" smtClean="0"/>
+              <a:rPr lang="en-US"/>
               <a:t>Edit Master text styles</a:t>
             </a:r>
           </a:p>
@@ -5797,7 +5692,7 @@
           <a:p>
             <a:fld id="{4079FD93-08D1-3D47-8B88-9F159745C9D8}" type="datetimeFigureOut">
               <a:rPr lang="en-US" smtClean="0"/>
-              <a:t>4/23/2021</a:t>
+              <a:t>4/25/2021</a:t>
             </a:fld>
             <a:endParaRPr lang="en-US"/>
           </a:p>
@@ -5855,13 +5750,6 @@
   <p:clrMapOvr>
     <a:masterClrMapping/>
   </p:clrMapOvr>
-  <p:timing>
-    <p:tnLst>
-      <p:par>
-        <p:cTn id="1" dur="indefinite" restart="never" nodeType="tmRoot"/>
-      </p:par>
-    </p:tnLst>
-  </p:timing>
 </p:sldLayout>
 </file>
 
@@ -6445,7 +6333,7 @@
           <a:lstStyle/>
           <a:p>
             <a:r>
-              <a:rPr lang="en-US" smtClean="0"/>
+              <a:rPr lang="en-US"/>
               <a:t>Click to edit Master title style</a:t>
             </a:r>
             <a:endParaRPr lang="en-US" dirty="0"/>
@@ -6479,35 +6367,35 @@
           <a:p>
             <a:pPr lvl="0"/>
             <a:r>
-              <a:rPr lang="en-US" smtClean="0"/>
+              <a:rPr lang="en-US"/>
               <a:t>Edit Master text styles</a:t>
             </a:r>
           </a:p>
           <a:p>
             <a:pPr lvl="1"/>
             <a:r>
-              <a:rPr lang="en-US" smtClean="0"/>
+              <a:rPr lang="en-US"/>
               <a:t>Second level</a:t>
             </a:r>
           </a:p>
           <a:p>
             <a:pPr lvl="2"/>
             <a:r>
-              <a:rPr lang="en-US" smtClean="0"/>
+              <a:rPr lang="en-US"/>
               <a:t>Third level</a:t>
             </a:r>
           </a:p>
           <a:p>
             <a:pPr lvl="3"/>
             <a:r>
-              <a:rPr lang="en-US" smtClean="0"/>
+              <a:rPr lang="en-US"/>
               <a:t>Fourth level</a:t>
             </a:r>
           </a:p>
           <a:p>
             <a:pPr lvl="4"/>
             <a:r>
-              <a:rPr lang="en-US" smtClean="0"/>
+              <a:rPr lang="en-US"/>
               <a:t>Fifth level</a:t>
             </a:r>
             <a:endParaRPr lang="en-US" dirty="0"/>
@@ -6549,7 +6437,7 @@
           <a:p>
             <a:fld id="{4079FD93-08D1-3D47-8B88-9F159745C9D8}" type="datetimeFigureOut">
               <a:rPr lang="en-US" smtClean="0"/>
-              <a:t>4/23/2021</a:t>
+              <a:t>4/25/2021</a:t>
             </a:fld>
             <a:endParaRPr lang="en-US"/>
           </a:p>
@@ -6670,13 +6558,6 @@
       </p:transition>
     </mc:Fallback>
   </mc:AlternateContent>
-  <p:timing>
-    <p:tnLst>
-      <p:par>
-        <p:cTn id="1" dur="indefinite" restart="never" nodeType="tmRoot"/>
-      </p:par>
-    </p:tnLst>
-  </p:timing>
   <p:txStyles>
     <p:titleStyle>
       <a:lvl1pPr algn="l" defTabSz="342900" rtl="0" eaLnBrk="1" latinLnBrk="0" hangingPunct="1">
@@ -7151,18 +7032,9 @@
           <a:p>
             <a:pPr fontAlgn="base"/>
             <a:r>
-              <a:rPr lang="en-US" sz="2000" dirty="0" smtClean="0"/>
-              <a:t>Q </a:t>
+              <a:rPr lang="en-US" sz="2000" dirty="0"/>
+              <a:t>Q &amp; A***</a:t>
             </a:r>
-            <a:r>
-              <a:rPr lang="en-US" sz="2000" dirty="0"/>
-              <a:t>&amp; A</a:t>
-            </a:r>
-            <a:r>
-              <a:rPr lang="en-US" sz="2000" dirty="0" smtClean="0"/>
-              <a:t>***</a:t>
-            </a:r>
-            <a:endParaRPr lang="en-US" sz="2000" dirty="0"/>
           </a:p>
         </p:txBody>
       </p:sp>
@@ -7740,6 +7612,46 @@
           </a:fontRef>
         </p:style>
       </p:cxnSp>
+      <p:sp>
+        <p:nvSpPr>
+          <p:cNvPr id="2" name="TextBox 1">
+            <a:extLst>
+              <a:ext uri="{FF2B5EF4-FFF2-40B4-BE49-F238E27FC236}">
+                <a16:creationId xmlns:a16="http://schemas.microsoft.com/office/drawing/2014/main" id="{8492C58A-B758-4A14-B21B-5F5CF4807ACB}"/>
+              </a:ext>
+            </a:extLst>
+          </p:cNvPr>
+          <p:cNvSpPr txBox="1"/>
+          <p:nvPr/>
+        </p:nvSpPr>
+        <p:spPr>
+          <a:xfrm>
+            <a:off x="238952" y="174812"/>
+            <a:ext cx="4931442" cy="523220"/>
+          </a:xfrm>
+          <a:prstGeom prst="rect">
+            <a:avLst/>
+          </a:prstGeom>
+          <a:noFill/>
+        </p:spPr>
+        <p:txBody>
+          <a:bodyPr wrap="square" rtlCol="0">
+            <a:spAutoFit/>
+          </a:bodyPr>
+          <a:lstStyle/>
+          <a:p>
+            <a:r>
+              <a:rPr lang="en-US" sz="2800" dirty="0"/>
+              <a:t>Fork in </a:t>
+            </a:r>
+            <a:r>
+              <a:rPr lang="en-US" sz="2800" dirty="0" err="1"/>
+              <a:t>Github</a:t>
+            </a:r>
+            <a:endParaRPr lang="en-US" sz="2800" dirty="0"/>
+          </a:p>
+        </p:txBody>
+      </p:sp>
     </p:spTree>
     <p:extLst>
       <p:ext uri="{BB962C8B-B14F-4D97-AF65-F5344CB8AC3E}">
@@ -13835,7 +13747,7 @@
         </p:nvSpPr>
         <p:spPr>
           <a:xfrm>
-            <a:off x="411996" y="-103704"/>
+            <a:off x="411996" y="0"/>
             <a:ext cx="7886700" cy="994172"/>
           </a:xfrm>
         </p:spPr>
@@ -13846,7 +13758,7 @@
             <a:r>
               <a:rPr lang="en-US" dirty="0">
                 <a:solidFill>
-                  <a:schemeClr val="bg1"/>
+                  <a:schemeClr val="tx1"/>
                 </a:solidFill>
               </a:rPr>
               <a:t>Go to Github.com</a:t>
@@ -14732,18 +14644,18 @@
 </file>
 
 <file path=customXml/item2.xml><?xml version="1.0" encoding="utf-8"?>
+<p:properties xmlns:p="http://schemas.microsoft.com/office/2006/metadata/properties" xmlns:xsi="http://www.w3.org/2001/XMLSchema-instance" xmlns:pc="http://schemas.microsoft.com/office/infopath/2007/PartnerControls">
+  <documentManagement/>
+</p:properties>
+</file>
+
+<file path=customXml/item3.xml><?xml version="1.0" encoding="utf-8"?>
 <?mso-contentType ?>
 <FormTemplates xmlns="http://schemas.microsoft.com/sharepoint/v3/contenttype/forms">
   <Display>DocumentLibraryForm</Display>
   <Edit>DocumentLibraryForm</Edit>
   <New>DocumentLibraryForm</New>
 </FormTemplates>
-</file>
-
-<file path=customXml/item3.xml><?xml version="1.0" encoding="utf-8"?>
-<p:properties xmlns:p="http://schemas.microsoft.com/office/2006/metadata/properties" xmlns:xsi="http://www.w3.org/2001/XMLSchema-instance" xmlns:pc="http://schemas.microsoft.com/office/infopath/2007/PartnerControls">
-  <documentManagement/>
-</p:properties>
 </file>
 
 <file path=customXml/itemProps1.xml><?xml version="1.0" encoding="utf-8"?>
@@ -14765,14 +14677,6 @@
 </file>
 
 <file path=customXml/itemProps2.xml><?xml version="1.0" encoding="utf-8"?>
-<ds:datastoreItem xmlns:ds="http://schemas.openxmlformats.org/officeDocument/2006/customXml" ds:itemID="{A681D2DF-F93E-4CC1-8A50-704C6CA0430E}">
-  <ds:schemaRefs>
-    <ds:schemaRef ds:uri="http://schemas.microsoft.com/sharepoint/v3/contenttype/forms"/>
-  </ds:schemaRefs>
-</ds:datastoreItem>
-</file>
-
-<file path=customXml/itemProps3.xml><?xml version="1.0" encoding="utf-8"?>
 <ds:datastoreItem xmlns:ds="http://schemas.openxmlformats.org/officeDocument/2006/customXml" ds:itemID="{7EF52303-DD41-4871-8221-5749C8E3EEE6}">
   <ds:schemaRefs>
     <ds:schemaRef ds:uri="http://purl.org/dc/elements/1.1/"/>
@@ -14787,4 +14691,12 @@
     <ds:schemaRef ds:uri="http://www.w3.org/XML/1998/namespace"/>
   </ds:schemaRefs>
 </ds:datastoreItem>
+</file>
+
+<file path=customXml/itemProps3.xml><?xml version="1.0" encoding="utf-8"?>
+<ds:datastoreItem xmlns:ds="http://schemas.openxmlformats.org/officeDocument/2006/customXml" ds:itemID="{A681D2DF-F93E-4CC1-8A50-704C6CA0430E}">
+  <ds:schemaRefs>
+    <ds:schemaRef ds:uri="http://schemas.microsoft.com/sharepoint/v3/contenttype/forms"/>
+  </ds:schemaRefs>
+</ds:datastoreItem>
 </file>
</xml_diff>

<commit_message>
added git github course materials
</commit_message>
<xml_diff>
--- a/03. Git & Github/Github.pptx
+++ b/03. Git & Github/Github.pptx
@@ -5,24 +5,28 @@
     <p:sldMasterId id="2147483868" r:id="rId4"/>
   </p:sldMasterIdLst>
   <p:notesMasterIdLst>
-    <p:notesMasterId r:id="rId20"/>
+    <p:notesMasterId r:id="rId24"/>
   </p:notesMasterIdLst>
   <p:sldIdLst>
     <p:sldId id="2180" r:id="rId5"/>
     <p:sldId id="266" r:id="rId6"/>
     <p:sldId id="257" r:id="rId7"/>
     <p:sldId id="259" r:id="rId8"/>
-    <p:sldId id="261" r:id="rId9"/>
-    <p:sldId id="2190" r:id="rId10"/>
-    <p:sldId id="2225" r:id="rId11"/>
-    <p:sldId id="2192" r:id="rId12"/>
-    <p:sldId id="2191" r:id="rId13"/>
-    <p:sldId id="2193" r:id="rId14"/>
-    <p:sldId id="2179" r:id="rId15"/>
-    <p:sldId id="2226" r:id="rId16"/>
-    <p:sldId id="2235" r:id="rId17"/>
-    <p:sldId id="2251" r:id="rId18"/>
-    <p:sldId id="2250" r:id="rId19"/>
+    <p:sldId id="2190" r:id="rId9"/>
+    <p:sldId id="2252" r:id="rId10"/>
+    <p:sldId id="2253" r:id="rId11"/>
+    <p:sldId id="2254" r:id="rId12"/>
+    <p:sldId id="2255" r:id="rId13"/>
+    <p:sldId id="2256" r:id="rId14"/>
+    <p:sldId id="2225" r:id="rId15"/>
+    <p:sldId id="2192" r:id="rId16"/>
+    <p:sldId id="2191" r:id="rId17"/>
+    <p:sldId id="2193" r:id="rId18"/>
+    <p:sldId id="2179" r:id="rId19"/>
+    <p:sldId id="2226" r:id="rId20"/>
+    <p:sldId id="2235" r:id="rId21"/>
+    <p:sldId id="2251" r:id="rId22"/>
+    <p:sldId id="2250" r:id="rId23"/>
   </p:sldIdLst>
   <p:sldSz cx="9144000" cy="5143500" type="screen16x9"/>
   <p:notesSz cx="6858000" cy="9144000"/>
@@ -247,7 +251,7 @@
           <a:p>
             <a:fld id="{AD890F14-D9B7-42F0-8464-D3AF2629EBA3}" type="datetimeFigureOut">
               <a:rPr lang="en-US" smtClean="0"/>
-              <a:t>4/25/2021</a:t>
+              <a:t>4/26/2021</a:t>
             </a:fld>
             <a:endParaRPr lang="en-US"/>
           </a:p>
@@ -890,7 +894,7 @@
           <a:p>
             <a:fld id="{24141B38-E2C6-4A63-9215-D38544DF7F12}" type="slidenum">
               <a:rPr lang="en-US" smtClean="0"/>
-              <a:t>11</a:t>
+              <a:t>15</a:t>
             </a:fld>
             <a:endParaRPr lang="en-US"/>
           </a:p>
@@ -1633,7 +1637,7 @@
           <a:p>
             <a:fld id="{4079FD93-08D1-3D47-8B88-9F159745C9D8}" type="datetimeFigureOut">
               <a:rPr lang="en-US" smtClean="0"/>
-              <a:t>4/25/2021</a:t>
+              <a:t>4/26/2021</a:t>
             </a:fld>
             <a:endParaRPr lang="en-US"/>
           </a:p>
@@ -1896,7 +1900,7 @@
           <a:p>
             <a:fld id="{4079FD93-08D1-3D47-8B88-9F159745C9D8}" type="datetimeFigureOut">
               <a:rPr lang="en-US" smtClean="0"/>
-              <a:t>4/25/2021</a:t>
+              <a:t>4/26/2021</a:t>
             </a:fld>
             <a:endParaRPr lang="en-US"/>
           </a:p>
@@ -2210,7 +2214,7 @@
           <a:p>
             <a:fld id="{4079FD93-08D1-3D47-8B88-9F159745C9D8}" type="datetimeFigureOut">
               <a:rPr lang="en-US" smtClean="0"/>
-              <a:t>4/25/2021</a:t>
+              <a:t>4/26/2021</a:t>
             </a:fld>
             <a:endParaRPr lang="en-US"/>
           </a:p>
@@ -2537,7 +2541,7 @@
           <a:p>
             <a:fld id="{4079FD93-08D1-3D47-8B88-9F159745C9D8}" type="datetimeFigureOut">
               <a:rPr lang="en-US" smtClean="0"/>
-              <a:t>4/25/2021</a:t>
+              <a:t>4/26/2021</a:t>
             </a:fld>
             <a:endParaRPr lang="en-US"/>
           </a:p>
@@ -2851,7 +2855,7 @@
           <a:p>
             <a:fld id="{4079FD93-08D1-3D47-8B88-9F159745C9D8}" type="datetimeFigureOut">
               <a:rPr lang="en-US" smtClean="0"/>
-              <a:t>4/25/2021</a:t>
+              <a:t>4/26/2021</a:t>
             </a:fld>
             <a:endParaRPr lang="en-US"/>
           </a:p>
@@ -3238,7 +3242,7 @@
           <a:p>
             <a:fld id="{4079FD93-08D1-3D47-8B88-9F159745C9D8}" type="datetimeFigureOut">
               <a:rPr lang="en-US" smtClean="0"/>
-              <a:t>4/25/2021</a:t>
+              <a:t>4/26/2021</a:t>
             </a:fld>
             <a:endParaRPr lang="en-US"/>
           </a:p>
@@ -3408,7 +3412,7 @@
           <a:p>
             <a:fld id="{4079FD93-08D1-3D47-8B88-9F159745C9D8}" type="datetimeFigureOut">
               <a:rPr lang="en-US" smtClean="0"/>
-              <a:t>4/25/2021</a:t>
+              <a:t>4/26/2021</a:t>
             </a:fld>
             <a:endParaRPr lang="en-US"/>
           </a:p>
@@ -3588,7 +3592,7 @@
           <a:p>
             <a:fld id="{4079FD93-08D1-3D47-8B88-9F159745C9D8}" type="datetimeFigureOut">
               <a:rPr lang="en-US" smtClean="0"/>
-              <a:t>4/25/2021</a:t>
+              <a:t>4/26/2021</a:t>
             </a:fld>
             <a:endParaRPr lang="en-US"/>
           </a:p>
@@ -3964,7 +3968,7 @@
                 <a:latin typeface="Segoe UI"/>
               </a:rPr>
               <a:pPr/>
-              <a:t>4/25/2021</a:t>
+              <a:t>4/26/2021</a:t>
             </a:fld>
             <a:endParaRPr lang="en-US">
               <a:solidFill>
@@ -4252,7 +4256,7 @@
           <a:p>
             <a:fld id="{4079FD93-08D1-3D47-8B88-9F159745C9D8}" type="datetimeFigureOut">
               <a:rPr lang="en-US" smtClean="0"/>
-              <a:t>4/25/2021</a:t>
+              <a:t>4/26/2021</a:t>
             </a:fld>
             <a:endParaRPr lang="en-US"/>
           </a:p>
@@ -4492,7 +4496,7 @@
                 <a:latin typeface="Segoe UI"/>
               </a:rPr>
               <a:pPr/>
-              <a:t>4/25/2021</a:t>
+              <a:t>4/26/2021</a:t>
             </a:fld>
             <a:endParaRPr lang="en-US">
               <a:solidFill>
@@ -4907,7 +4911,7 @@
           <a:p>
             <a:fld id="{4079FD93-08D1-3D47-8B88-9F159745C9D8}" type="datetimeFigureOut">
               <a:rPr lang="en-US" smtClean="0"/>
-              <a:t>4/25/2021</a:t>
+              <a:t>4/26/2021</a:t>
             </a:fld>
             <a:endParaRPr lang="en-US"/>
           </a:p>
@@ -5038,7 +5042,7 @@
                 <a:latin typeface="Segoe UI"/>
               </a:rPr>
               <a:pPr/>
-              <a:t>4/25/2021</a:t>
+              <a:t>4/26/2021</a:t>
             </a:fld>
             <a:endParaRPr lang="en-US">
               <a:solidFill>
@@ -5174,7 +5178,7 @@
           <a:p>
             <a:fld id="{4079FD93-08D1-3D47-8B88-9F159745C9D8}" type="datetimeFigureOut">
               <a:rPr lang="en-US" smtClean="0"/>
-              <a:t>4/25/2021</a:t>
+              <a:t>4/26/2021</a:t>
             </a:fld>
             <a:endParaRPr lang="en-US"/>
           </a:p>
@@ -5429,7 +5433,7 @@
           <a:p>
             <a:fld id="{4079FD93-08D1-3D47-8B88-9F159745C9D8}" type="datetimeFigureOut">
               <a:rPr lang="en-US" smtClean="0"/>
-              <a:t>4/25/2021</a:t>
+              <a:t>4/26/2021</a:t>
             </a:fld>
             <a:endParaRPr lang="en-US"/>
           </a:p>
@@ -5692,7 +5696,7 @@
           <a:p>
             <a:fld id="{4079FD93-08D1-3D47-8B88-9F159745C9D8}" type="datetimeFigureOut">
               <a:rPr lang="en-US" smtClean="0"/>
-              <a:t>4/25/2021</a:t>
+              <a:t>4/26/2021</a:t>
             </a:fld>
             <a:endParaRPr lang="en-US"/>
           </a:p>
@@ -6437,7 +6441,7 @@
           <a:p>
             <a:fld id="{4079FD93-08D1-3D47-8B88-9F159745C9D8}" type="datetimeFigureOut">
               <a:rPr lang="en-US" smtClean="0"/>
-              <a:t>4/25/2021</a:t>
+              <a:t>4/26/2021</a:t>
             </a:fld>
             <a:endParaRPr lang="en-US"/>
           </a:p>
@@ -7456,6 +7460,940 @@
           <a:chExt cx="0" cy="0"/>
         </a:xfrm>
       </p:grpSpPr>
+      <p:sp>
+        <p:nvSpPr>
+          <p:cNvPr id="2" name="Title 1">
+            <a:extLst>
+              <a:ext uri="{FF2B5EF4-FFF2-40B4-BE49-F238E27FC236}">
+                <a16:creationId xmlns:a16="http://schemas.microsoft.com/office/drawing/2014/main" id="{6DF0BFBB-41E6-470D-9EDF-224AD7A3D8D4}"/>
+              </a:ext>
+            </a:extLst>
+          </p:cNvPr>
+          <p:cNvSpPr>
+            <a:spLocks noGrp="1"/>
+          </p:cNvSpPr>
+          <p:nvPr>
+            <p:ph type="title"/>
+          </p:nvPr>
+        </p:nvSpPr>
+        <p:spPr/>
+        <p:txBody>
+          <a:bodyPr>
+            <a:normAutofit/>
+          </a:bodyPr>
+          <a:lstStyle/>
+          <a:p>
+            <a:r>
+              <a:rPr lang="en-US" sz="4400" dirty="0">
+                <a:solidFill>
+                  <a:schemeClr val="tx1"/>
+                </a:solidFill>
+              </a:rPr>
+              <a:t>			</a:t>
+            </a:r>
+            <a:r>
+              <a:rPr lang="en-US" sz="4400" dirty="0" err="1">
+                <a:solidFill>
+                  <a:schemeClr val="tx1"/>
+                </a:solidFill>
+              </a:rPr>
+              <a:t>Github</a:t>
+            </a:r>
+            <a:r>
+              <a:rPr lang="en-US" sz="4400" dirty="0">
+                <a:solidFill>
+                  <a:schemeClr val="tx1"/>
+                </a:solidFill>
+              </a:rPr>
+              <a:t> Workflow</a:t>
+            </a:r>
+          </a:p>
+        </p:txBody>
+      </p:sp>
+      <p:pic>
+        <p:nvPicPr>
+          <p:cNvPr id="5" name="Picture 4">
+            <a:extLst>
+              <a:ext uri="{FF2B5EF4-FFF2-40B4-BE49-F238E27FC236}">
+                <a16:creationId xmlns:a16="http://schemas.microsoft.com/office/drawing/2014/main" id="{5AE86492-AFB2-44F5-8EC5-E162D9E38633}"/>
+              </a:ext>
+            </a:extLst>
+          </p:cNvPr>
+          <p:cNvPicPr>
+            <a:picLocks noChangeAspect="1"/>
+          </p:cNvPicPr>
+          <p:nvPr/>
+        </p:nvPicPr>
+        <p:blipFill>
+          <a:blip r:embed="rId2"/>
+          <a:stretch>
+            <a:fillRect/>
+          </a:stretch>
+        </p:blipFill>
+        <p:spPr>
+          <a:xfrm>
+            <a:off x="324457" y="1528482"/>
+            <a:ext cx="7804844" cy="2458571"/>
+          </a:xfrm>
+          <a:prstGeom prst="rect">
+            <a:avLst/>
+          </a:prstGeom>
+        </p:spPr>
+      </p:pic>
+    </p:spTree>
+    <p:extLst>
+      <p:ext uri="{BB962C8B-B14F-4D97-AF65-F5344CB8AC3E}">
+        <p14:creationId xmlns:p14="http://schemas.microsoft.com/office/powerpoint/2010/main" val="1845136711"/>
+      </p:ext>
+    </p:extLst>
+  </p:cSld>
+  <p:clrMapOvr>
+    <a:masterClrMapping/>
+  </p:clrMapOvr>
+  <mc:AlternateContent xmlns:mc="http://schemas.openxmlformats.org/markup-compatibility/2006" xmlns:p14="http://schemas.microsoft.com/office/powerpoint/2010/main">
+    <mc:Choice Requires="p14">
+      <p:transition spd="med" p14:dur="700">
+        <p:fade/>
+      </p:transition>
+    </mc:Choice>
+    <mc:Fallback xmlns="">
+      <p:transition spd="med">
+        <p:fade/>
+      </p:transition>
+    </mc:Fallback>
+  </mc:AlternateContent>
+</p:sld>
+</file>
+
+<file path=ppt/slides/slide11.xml><?xml version="1.0" encoding="utf-8"?>
+<p:sld xmlns:a="http://schemas.openxmlformats.org/drawingml/2006/main" xmlns:r="http://schemas.openxmlformats.org/officeDocument/2006/relationships" xmlns:p="http://schemas.openxmlformats.org/presentationml/2006/main">
+  <p:cSld>
+    <p:spTree>
+      <p:nvGrpSpPr>
+        <p:cNvPr id="1" name=""/>
+        <p:cNvGrpSpPr/>
+        <p:nvPr/>
+      </p:nvGrpSpPr>
+      <p:grpSpPr>
+        <a:xfrm>
+          <a:off x="0" y="0"/>
+          <a:ext cx="0" cy="0"/>
+          <a:chOff x="0" y="0"/>
+          <a:chExt cx="0" cy="0"/>
+        </a:xfrm>
+      </p:grpSpPr>
+      <p:sp>
+        <p:nvSpPr>
+          <p:cNvPr id="2" name="Title 1">
+            <a:extLst>
+              <a:ext uri="{FF2B5EF4-FFF2-40B4-BE49-F238E27FC236}">
+                <a16:creationId xmlns:a16="http://schemas.microsoft.com/office/drawing/2014/main" id="{406663AA-EBB5-4E73-A044-136A31C1D645}"/>
+              </a:ext>
+            </a:extLst>
+          </p:cNvPr>
+          <p:cNvSpPr>
+            <a:spLocks noGrp="1"/>
+          </p:cNvSpPr>
+          <p:nvPr>
+            <p:ph type="title"/>
+          </p:nvPr>
+        </p:nvSpPr>
+        <p:spPr>
+          <a:xfrm>
+            <a:off x="270431" y="57010"/>
+            <a:ext cx="7886700" cy="974852"/>
+          </a:xfrm>
+        </p:spPr>
+        <p:txBody>
+          <a:bodyPr>
+            <a:normAutofit/>
+          </a:bodyPr>
+          <a:lstStyle/>
+          <a:p>
+            <a:r>
+              <a:rPr lang="en-US" sz="3200" dirty="0">
+                <a:solidFill>
+                  <a:schemeClr val="tx1"/>
+                </a:solidFill>
+              </a:rPr>
+              <a:t>Contributor vs Collaborator </a:t>
+            </a:r>
+          </a:p>
+        </p:txBody>
+      </p:sp>
+      <p:pic>
+        <p:nvPicPr>
+          <p:cNvPr id="8" name="Picture 7" descr="A picture containing drawing&#10;&#10;Description automatically generated">
+            <a:extLst>
+              <a:ext uri="{FF2B5EF4-FFF2-40B4-BE49-F238E27FC236}">
+                <a16:creationId xmlns:a16="http://schemas.microsoft.com/office/drawing/2014/main" id="{C12DE027-99E9-47C0-8B39-31F5FD14B673}"/>
+              </a:ext>
+            </a:extLst>
+          </p:cNvPr>
+          <p:cNvPicPr>
+            <a:picLocks noChangeAspect="1"/>
+          </p:cNvPicPr>
+          <p:nvPr/>
+        </p:nvPicPr>
+        <p:blipFill>
+          <a:blip r:embed="rId2">
+            <a:extLst>
+              <a:ext uri="{28A0092B-C50C-407E-A947-70E740481C1C}">
+                <a14:useLocalDpi xmlns:a14="http://schemas.microsoft.com/office/drawing/2010/main" val="0"/>
+              </a:ext>
+            </a:extLst>
+          </a:blip>
+          <a:stretch>
+            <a:fillRect/>
+          </a:stretch>
+        </p:blipFill>
+        <p:spPr>
+          <a:xfrm>
+            <a:off x="2430627" y="2668402"/>
+            <a:ext cx="1920656" cy="1920656"/>
+          </a:xfrm>
+          <a:prstGeom prst="rect">
+            <a:avLst/>
+          </a:prstGeom>
+        </p:spPr>
+      </p:pic>
+      <p:pic>
+        <p:nvPicPr>
+          <p:cNvPr id="10" name="Picture 9" descr="A picture containing drawing&#10;&#10;Description automatically generated">
+            <a:extLst>
+              <a:ext uri="{FF2B5EF4-FFF2-40B4-BE49-F238E27FC236}">
+                <a16:creationId xmlns:a16="http://schemas.microsoft.com/office/drawing/2014/main" id="{EACCBE2A-AF41-4343-8005-FC5D7942436F}"/>
+              </a:ext>
+            </a:extLst>
+          </p:cNvPr>
+          <p:cNvPicPr>
+            <a:picLocks noChangeAspect="1"/>
+          </p:cNvPicPr>
+          <p:nvPr/>
+        </p:nvPicPr>
+        <p:blipFill>
+          <a:blip r:embed="rId3">
+            <a:extLst>
+              <a:ext uri="{28A0092B-C50C-407E-A947-70E740481C1C}">
+                <a14:useLocalDpi xmlns:a14="http://schemas.microsoft.com/office/drawing/2010/main" val="0"/>
+              </a:ext>
+            </a:extLst>
+          </a:blip>
+          <a:stretch>
+            <a:fillRect/>
+          </a:stretch>
+        </p:blipFill>
+        <p:spPr>
+          <a:xfrm>
+            <a:off x="4847176" y="2791671"/>
+            <a:ext cx="2002941" cy="1651205"/>
+          </a:xfrm>
+          <a:prstGeom prst="rect">
+            <a:avLst/>
+          </a:prstGeom>
+        </p:spPr>
+      </p:pic>
+      <p:sp>
+        <p:nvSpPr>
+          <p:cNvPr id="12" name="Rectangle 11">
+            <a:extLst>
+              <a:ext uri="{FF2B5EF4-FFF2-40B4-BE49-F238E27FC236}">
+                <a16:creationId xmlns:a16="http://schemas.microsoft.com/office/drawing/2014/main" id="{6A78E89C-2A9B-46D3-9BBF-5C06BB3C5815}"/>
+              </a:ext>
+            </a:extLst>
+          </p:cNvPr>
+          <p:cNvSpPr/>
+          <p:nvPr/>
+        </p:nvSpPr>
+        <p:spPr>
+          <a:xfrm>
+            <a:off x="402021" y="1024758"/>
+            <a:ext cx="8371489" cy="1477328"/>
+          </a:xfrm>
+          <a:prstGeom prst="rect">
+            <a:avLst/>
+          </a:prstGeom>
+        </p:spPr>
+        <p:txBody>
+          <a:bodyPr wrap="square">
+            <a:spAutoFit/>
+          </a:bodyPr>
+          <a:lstStyle/>
+          <a:p>
+            <a:pPr marL="285750" indent="-285750" algn="just">
+              <a:buFont typeface="Arial" panose="020B0604020202020204" pitchFamily="34" charset="0"/>
+              <a:buChar char="•"/>
+            </a:pPr>
+            <a:r>
+              <a:rPr lang="en-US" b="1" dirty="0">
+                <a:latin typeface="arial" panose="020B0604020202020204" pitchFamily="34" charset="0"/>
+              </a:rPr>
+              <a:t>Contributor</a:t>
+            </a:r>
+            <a:r>
+              <a:rPr lang="en-US" dirty="0">
+                <a:latin typeface="arial" panose="020B0604020202020204" pitchFamily="34" charset="0"/>
+              </a:rPr>
+              <a:t>: A </a:t>
+            </a:r>
+            <a:r>
+              <a:rPr lang="en-US" b="1" dirty="0">
+                <a:latin typeface="arial" panose="020B0604020202020204" pitchFamily="34" charset="0"/>
+              </a:rPr>
+              <a:t>contributor</a:t>
+            </a:r>
+            <a:r>
+              <a:rPr lang="en-US" dirty="0">
+                <a:latin typeface="arial" panose="020B0604020202020204" pitchFamily="34" charset="0"/>
+              </a:rPr>
+              <a:t> is someone from the outside not on the core development team of the project that wants to contribute some changes to a project.</a:t>
+            </a:r>
+          </a:p>
+          <a:p>
+            <a:pPr marL="285750" indent="-285750" algn="just">
+              <a:buFont typeface="Arial" panose="020B0604020202020204" pitchFamily="34" charset="0"/>
+              <a:buChar char="•"/>
+            </a:pPr>
+            <a:r>
+              <a:rPr lang="en-US" b="1" dirty="0">
+                <a:latin typeface="arial" panose="020B0604020202020204" pitchFamily="34" charset="0"/>
+              </a:rPr>
+              <a:t>*** Collaborator</a:t>
+            </a:r>
+            <a:r>
+              <a:rPr lang="en-US" dirty="0">
+                <a:latin typeface="arial" panose="020B0604020202020204" pitchFamily="34" charset="0"/>
+              </a:rPr>
+              <a:t>: A </a:t>
+            </a:r>
+            <a:r>
+              <a:rPr lang="en-US" b="1" dirty="0">
+                <a:latin typeface="arial" panose="020B0604020202020204" pitchFamily="34" charset="0"/>
+              </a:rPr>
+              <a:t>collaborator</a:t>
+            </a:r>
+            <a:r>
+              <a:rPr lang="en-US" dirty="0">
+                <a:latin typeface="arial" panose="020B0604020202020204" pitchFamily="34" charset="0"/>
+              </a:rPr>
+              <a:t> is someone on the core development team of the project </a:t>
+            </a:r>
+            <a:r>
+              <a:rPr lang="en-US" b="1" dirty="0">
+                <a:latin typeface="arial" panose="020B0604020202020204" pitchFamily="34" charset="0"/>
+              </a:rPr>
+              <a:t>and</a:t>
+            </a:r>
+            <a:r>
+              <a:rPr lang="en-US" dirty="0">
+                <a:latin typeface="arial" panose="020B0604020202020204" pitchFamily="34" charset="0"/>
+              </a:rPr>
+              <a:t> has commit access to the main repository of the project.</a:t>
+            </a:r>
+            <a:endParaRPr lang="en-IN" dirty="0"/>
+          </a:p>
+        </p:txBody>
+      </p:sp>
+    </p:spTree>
+    <p:extLst>
+      <p:ext uri="{BB962C8B-B14F-4D97-AF65-F5344CB8AC3E}">
+        <p14:creationId xmlns:p14="http://schemas.microsoft.com/office/powerpoint/2010/main" val="4153876519"/>
+      </p:ext>
+    </p:extLst>
+  </p:cSld>
+  <p:clrMapOvr>
+    <a:masterClrMapping/>
+  </p:clrMapOvr>
+  <mc:AlternateContent xmlns:mc="http://schemas.openxmlformats.org/markup-compatibility/2006" xmlns:p14="http://schemas.microsoft.com/office/powerpoint/2010/main">
+    <mc:Choice Requires="p14">
+      <p:transition spd="med" p14:dur="700">
+        <p:fade/>
+      </p:transition>
+    </mc:Choice>
+    <mc:Fallback xmlns="">
+      <p:transition spd="med">
+        <p:fade/>
+      </p:transition>
+    </mc:Fallback>
+  </mc:AlternateContent>
+  <p:timing>
+    <p:tnLst>
+      <p:par>
+        <p:cTn id="1" dur="indefinite" restart="never" nodeType="tmRoot">
+          <p:childTnLst>
+            <p:seq concurrent="1" nextAc="seek">
+              <p:cTn id="2" dur="indefinite" nodeType="mainSeq">
+                <p:childTnLst>
+                  <p:par>
+                    <p:cTn id="3" fill="hold">
+                      <p:stCondLst>
+                        <p:cond delay="indefinite"/>
+                      </p:stCondLst>
+                      <p:childTnLst>
+                        <p:par>
+                          <p:cTn id="4" fill="hold">
+                            <p:stCondLst>
+                              <p:cond delay="0"/>
+                            </p:stCondLst>
+                            <p:childTnLst>
+                              <p:par>
+                                <p:cTn id="5" presetID="42" presetClass="entr" presetSubtype="0" fill="hold" nodeType="clickEffect">
+                                  <p:stCondLst>
+                                    <p:cond delay="0"/>
+                                  </p:stCondLst>
+                                  <p:childTnLst>
+                                    <p:set>
+                                      <p:cBhvr>
+                                        <p:cTn id="6" dur="1" fill="hold">
+                                          <p:stCondLst>
+                                            <p:cond delay="0"/>
+                                          </p:stCondLst>
+                                        </p:cTn>
+                                        <p:tgtEl>
+                                          <p:spTgt spid="12">
+                                            <p:txEl>
+                                              <p:pRg st="0" end="0"/>
+                                            </p:txEl>
+                                          </p:spTgt>
+                                        </p:tgtEl>
+                                        <p:attrNameLst>
+                                          <p:attrName>style.visibility</p:attrName>
+                                        </p:attrNameLst>
+                                      </p:cBhvr>
+                                      <p:to>
+                                        <p:strVal val="visible"/>
+                                      </p:to>
+                                    </p:set>
+                                    <p:animEffect transition="in" filter="fade">
+                                      <p:cBhvr>
+                                        <p:cTn id="7" dur="1000"/>
+                                        <p:tgtEl>
+                                          <p:spTgt spid="12">
+                                            <p:txEl>
+                                              <p:pRg st="0" end="0"/>
+                                            </p:txEl>
+                                          </p:spTgt>
+                                        </p:tgtEl>
+                                      </p:cBhvr>
+                                    </p:animEffect>
+                                    <p:anim calcmode="lin" valueType="num">
+                                      <p:cBhvr>
+                                        <p:cTn id="8" dur="1000" fill="hold"/>
+                                        <p:tgtEl>
+                                          <p:spTgt spid="12">
+                                            <p:txEl>
+                                              <p:pRg st="0" end="0"/>
+                                            </p:txEl>
+                                          </p:spTgt>
+                                        </p:tgtEl>
+                                        <p:attrNameLst>
+                                          <p:attrName>ppt_x</p:attrName>
+                                        </p:attrNameLst>
+                                      </p:cBhvr>
+                                      <p:tavLst>
+                                        <p:tav tm="0">
+                                          <p:val>
+                                            <p:strVal val="#ppt_x"/>
+                                          </p:val>
+                                        </p:tav>
+                                        <p:tav tm="100000">
+                                          <p:val>
+                                            <p:strVal val="#ppt_x"/>
+                                          </p:val>
+                                        </p:tav>
+                                      </p:tavLst>
+                                    </p:anim>
+                                    <p:anim calcmode="lin" valueType="num">
+                                      <p:cBhvr>
+                                        <p:cTn id="9" dur="1000" fill="hold"/>
+                                        <p:tgtEl>
+                                          <p:spTgt spid="12">
+                                            <p:txEl>
+                                              <p:pRg st="0" end="0"/>
+                                            </p:txEl>
+                                          </p:spTgt>
+                                        </p:tgtEl>
+                                        <p:attrNameLst>
+                                          <p:attrName>ppt_y</p:attrName>
+                                        </p:attrNameLst>
+                                      </p:cBhvr>
+                                      <p:tavLst>
+                                        <p:tav tm="0">
+                                          <p:val>
+                                            <p:strVal val="#ppt_y+.1"/>
+                                          </p:val>
+                                        </p:tav>
+                                        <p:tav tm="100000">
+                                          <p:val>
+                                            <p:strVal val="#ppt_y"/>
+                                          </p:val>
+                                        </p:tav>
+                                      </p:tavLst>
+                                    </p:anim>
+                                  </p:childTnLst>
+                                </p:cTn>
+                              </p:par>
+                            </p:childTnLst>
+                          </p:cTn>
+                        </p:par>
+                      </p:childTnLst>
+                    </p:cTn>
+                  </p:par>
+                  <p:par>
+                    <p:cTn id="10" fill="hold">
+                      <p:stCondLst>
+                        <p:cond delay="indefinite"/>
+                      </p:stCondLst>
+                      <p:childTnLst>
+                        <p:par>
+                          <p:cTn id="11" fill="hold">
+                            <p:stCondLst>
+                              <p:cond delay="0"/>
+                            </p:stCondLst>
+                            <p:childTnLst>
+                              <p:par>
+                                <p:cTn id="12" presetID="42" presetClass="entr" presetSubtype="0" fill="hold" nodeType="clickEffect">
+                                  <p:stCondLst>
+                                    <p:cond delay="0"/>
+                                  </p:stCondLst>
+                                  <p:childTnLst>
+                                    <p:set>
+                                      <p:cBhvr>
+                                        <p:cTn id="13" dur="1" fill="hold">
+                                          <p:stCondLst>
+                                            <p:cond delay="0"/>
+                                          </p:stCondLst>
+                                        </p:cTn>
+                                        <p:tgtEl>
+                                          <p:spTgt spid="12">
+                                            <p:txEl>
+                                              <p:pRg st="1" end="1"/>
+                                            </p:txEl>
+                                          </p:spTgt>
+                                        </p:tgtEl>
+                                        <p:attrNameLst>
+                                          <p:attrName>style.visibility</p:attrName>
+                                        </p:attrNameLst>
+                                      </p:cBhvr>
+                                      <p:to>
+                                        <p:strVal val="visible"/>
+                                      </p:to>
+                                    </p:set>
+                                    <p:animEffect transition="in" filter="fade">
+                                      <p:cBhvr>
+                                        <p:cTn id="14" dur="1000"/>
+                                        <p:tgtEl>
+                                          <p:spTgt spid="12">
+                                            <p:txEl>
+                                              <p:pRg st="1" end="1"/>
+                                            </p:txEl>
+                                          </p:spTgt>
+                                        </p:tgtEl>
+                                      </p:cBhvr>
+                                    </p:animEffect>
+                                    <p:anim calcmode="lin" valueType="num">
+                                      <p:cBhvr>
+                                        <p:cTn id="15" dur="1000" fill="hold"/>
+                                        <p:tgtEl>
+                                          <p:spTgt spid="12">
+                                            <p:txEl>
+                                              <p:pRg st="1" end="1"/>
+                                            </p:txEl>
+                                          </p:spTgt>
+                                        </p:tgtEl>
+                                        <p:attrNameLst>
+                                          <p:attrName>ppt_x</p:attrName>
+                                        </p:attrNameLst>
+                                      </p:cBhvr>
+                                      <p:tavLst>
+                                        <p:tav tm="0">
+                                          <p:val>
+                                            <p:strVal val="#ppt_x"/>
+                                          </p:val>
+                                        </p:tav>
+                                        <p:tav tm="100000">
+                                          <p:val>
+                                            <p:strVal val="#ppt_x"/>
+                                          </p:val>
+                                        </p:tav>
+                                      </p:tavLst>
+                                    </p:anim>
+                                    <p:anim calcmode="lin" valueType="num">
+                                      <p:cBhvr>
+                                        <p:cTn id="16" dur="1000" fill="hold"/>
+                                        <p:tgtEl>
+                                          <p:spTgt spid="12">
+                                            <p:txEl>
+                                              <p:pRg st="1" end="1"/>
+                                            </p:txEl>
+                                          </p:spTgt>
+                                        </p:tgtEl>
+                                        <p:attrNameLst>
+                                          <p:attrName>ppt_y</p:attrName>
+                                        </p:attrNameLst>
+                                      </p:cBhvr>
+                                      <p:tavLst>
+                                        <p:tav tm="0">
+                                          <p:val>
+                                            <p:strVal val="#ppt_y+.1"/>
+                                          </p:val>
+                                        </p:tav>
+                                        <p:tav tm="100000">
+                                          <p:val>
+                                            <p:strVal val="#ppt_y"/>
+                                          </p:val>
+                                        </p:tav>
+                                      </p:tavLst>
+                                    </p:anim>
+                                  </p:childTnLst>
+                                </p:cTn>
+                              </p:par>
+                            </p:childTnLst>
+                          </p:cTn>
+                        </p:par>
+                      </p:childTnLst>
+                    </p:cTn>
+                  </p:par>
+                </p:childTnLst>
+              </p:cTn>
+              <p:prevCondLst>
+                <p:cond evt="onPrev" delay="0">
+                  <p:tgtEl>
+                    <p:sldTgt/>
+                  </p:tgtEl>
+                </p:cond>
+              </p:prevCondLst>
+              <p:nextCondLst>
+                <p:cond evt="onNext" delay="0">
+                  <p:tgtEl>
+                    <p:sldTgt/>
+                  </p:tgtEl>
+                </p:cond>
+              </p:nextCondLst>
+            </p:seq>
+          </p:childTnLst>
+        </p:cTn>
+      </p:par>
+    </p:tnLst>
+  </p:timing>
+</p:sld>
+</file>
+
+<file path=ppt/slides/slide12.xml><?xml version="1.0" encoding="utf-8"?>
+<p:sld xmlns:a="http://schemas.openxmlformats.org/drawingml/2006/main" xmlns:r="http://schemas.openxmlformats.org/officeDocument/2006/relationships" xmlns:p="http://schemas.openxmlformats.org/presentationml/2006/main">
+  <p:cSld>
+    <p:spTree>
+      <p:nvGrpSpPr>
+        <p:cNvPr id="1" name=""/>
+        <p:cNvGrpSpPr/>
+        <p:nvPr/>
+      </p:nvGrpSpPr>
+      <p:grpSpPr>
+        <a:xfrm>
+          <a:off x="0" y="0"/>
+          <a:ext cx="0" cy="0"/>
+          <a:chOff x="0" y="0"/>
+          <a:chExt cx="0" cy="0"/>
+        </a:xfrm>
+      </p:grpSpPr>
+      <p:sp>
+        <p:nvSpPr>
+          <p:cNvPr id="3" name="Content Placeholder 2">
+            <a:extLst>
+              <a:ext uri="{FF2B5EF4-FFF2-40B4-BE49-F238E27FC236}">
+                <a16:creationId xmlns:a16="http://schemas.microsoft.com/office/drawing/2014/main" id="{32B86DBA-27DF-4A90-A6B6-700AC8D4BE2D}"/>
+              </a:ext>
+            </a:extLst>
+          </p:cNvPr>
+          <p:cNvSpPr>
+            <a:spLocks noGrp="1"/>
+          </p:cNvSpPr>
+          <p:nvPr>
+            <p:ph idx="1"/>
+          </p:nvPr>
+        </p:nvSpPr>
+        <p:spPr>
+          <a:xfrm>
+            <a:off x="1741013" y="1520048"/>
+            <a:ext cx="7886700" cy="3263504"/>
+          </a:xfrm>
+        </p:spPr>
+        <p:txBody>
+          <a:bodyPr>
+            <a:normAutofit/>
+          </a:bodyPr>
+          <a:lstStyle/>
+          <a:p>
+            <a:pPr marL="0" indent="0">
+              <a:buNone/>
+            </a:pPr>
+            <a:r>
+              <a:rPr lang="en-IN" sz="6000" dirty="0"/>
+              <a:t>What’s Next?</a:t>
+            </a:r>
+          </a:p>
+          <a:p>
+            <a:pPr marL="0" indent="0">
+              <a:buNone/>
+            </a:pPr>
+            <a:r>
+              <a:rPr lang="en-IN" sz="6000" dirty="0"/>
+              <a:t>Do some Hands-On</a:t>
+            </a:r>
+          </a:p>
+        </p:txBody>
+      </p:sp>
+    </p:spTree>
+    <p:extLst>
+      <p:ext uri="{BB962C8B-B14F-4D97-AF65-F5344CB8AC3E}">
+        <p14:creationId xmlns:p14="http://schemas.microsoft.com/office/powerpoint/2010/main" val="3863471975"/>
+      </p:ext>
+    </p:extLst>
+  </p:cSld>
+  <p:clrMapOvr>
+    <a:masterClrMapping/>
+  </p:clrMapOvr>
+  <mc:AlternateContent xmlns:mc="http://schemas.openxmlformats.org/markup-compatibility/2006" xmlns:p14="http://schemas.microsoft.com/office/powerpoint/2010/main">
+    <mc:Choice Requires="p14">
+      <p:transition spd="med" p14:dur="700">
+        <p:fade/>
+      </p:transition>
+    </mc:Choice>
+    <mc:Fallback xmlns="">
+      <p:transition spd="med">
+        <p:fade/>
+      </p:transition>
+    </mc:Fallback>
+  </mc:AlternateContent>
+</p:sld>
+</file>
+
+<file path=ppt/slides/slide13.xml><?xml version="1.0" encoding="utf-8"?>
+<p:sld xmlns:a="http://schemas.openxmlformats.org/drawingml/2006/main" xmlns:r="http://schemas.openxmlformats.org/officeDocument/2006/relationships" xmlns:p="http://schemas.openxmlformats.org/presentationml/2006/main">
+  <p:cSld>
+    <p:spTree>
+      <p:nvGrpSpPr>
+        <p:cNvPr id="1" name=""/>
+        <p:cNvGrpSpPr/>
+        <p:nvPr/>
+      </p:nvGrpSpPr>
+      <p:grpSpPr>
+        <a:xfrm>
+          <a:off x="0" y="0"/>
+          <a:ext cx="0" cy="0"/>
+          <a:chOff x="0" y="0"/>
+          <a:chExt cx="0" cy="0"/>
+        </a:xfrm>
+      </p:grpSpPr>
+      <p:sp>
+        <p:nvSpPr>
+          <p:cNvPr id="6" name="Title 1">
+            <a:extLst>
+              <a:ext uri="{FF2B5EF4-FFF2-40B4-BE49-F238E27FC236}">
+                <a16:creationId xmlns:a16="http://schemas.microsoft.com/office/drawing/2014/main" id="{5B7C5DBC-83A1-4533-99CF-E7AC797BBCF3}"/>
+              </a:ext>
+            </a:extLst>
+          </p:cNvPr>
+          <p:cNvSpPr>
+            <a:spLocks noGrp="1"/>
+          </p:cNvSpPr>
+          <p:nvPr>
+            <p:ph type="title"/>
+          </p:nvPr>
+        </p:nvSpPr>
+        <p:spPr>
+          <a:xfrm>
+            <a:off x="411996" y="0"/>
+            <a:ext cx="7886700" cy="994172"/>
+          </a:xfrm>
+        </p:spPr>
+        <p:txBody>
+          <a:bodyPr/>
+          <a:lstStyle/>
+          <a:p>
+            <a:r>
+              <a:rPr lang="en-US" dirty="0">
+                <a:solidFill>
+                  <a:schemeClr val="tx1"/>
+                </a:solidFill>
+              </a:rPr>
+              <a:t>Go to Github.com</a:t>
+            </a:r>
+          </a:p>
+        </p:txBody>
+      </p:sp>
+      <p:sp>
+        <p:nvSpPr>
+          <p:cNvPr id="9" name="Rectangle 8">
+            <a:extLst>
+              <a:ext uri="{FF2B5EF4-FFF2-40B4-BE49-F238E27FC236}">
+                <a16:creationId xmlns:a16="http://schemas.microsoft.com/office/drawing/2014/main" id="{FAD04910-4844-4CF3-9311-C708C44EB733}"/>
+              </a:ext>
+            </a:extLst>
+          </p:cNvPr>
+          <p:cNvSpPr/>
+          <p:nvPr/>
+        </p:nvSpPr>
+        <p:spPr>
+          <a:xfrm>
+            <a:off x="127591" y="4699591"/>
+            <a:ext cx="2541181" cy="329609"/>
+          </a:xfrm>
+          <a:prstGeom prst="rect">
+            <a:avLst/>
+          </a:prstGeom>
+          <a:solidFill>
+            <a:schemeClr val="bg1"/>
+          </a:solidFill>
+          <a:ln>
+            <a:noFill/>
+          </a:ln>
+        </p:spPr>
+        <p:style>
+          <a:lnRef idx="2">
+            <a:schemeClr val="accent6"/>
+          </a:lnRef>
+          <a:fillRef idx="1">
+            <a:schemeClr val="lt1"/>
+          </a:fillRef>
+          <a:effectRef idx="0">
+            <a:schemeClr val="accent6"/>
+          </a:effectRef>
+          <a:fontRef idx="minor">
+            <a:schemeClr val="dk1"/>
+          </a:fontRef>
+        </p:style>
+        <p:txBody>
+          <a:bodyPr rtlCol="0" anchor="ctr"/>
+          <a:lstStyle/>
+          <a:p>
+            <a:pPr algn="ctr"/>
+            <a:endParaRPr lang="en-IN"/>
+          </a:p>
+        </p:txBody>
+      </p:sp>
+      <p:sp>
+        <p:nvSpPr>
+          <p:cNvPr id="10" name="Rectangle 9">
+            <a:extLst>
+              <a:ext uri="{FF2B5EF4-FFF2-40B4-BE49-F238E27FC236}">
+                <a16:creationId xmlns:a16="http://schemas.microsoft.com/office/drawing/2014/main" id="{2081E9AD-4EBA-4180-A02B-7344808D8989}"/>
+              </a:ext>
+            </a:extLst>
+          </p:cNvPr>
+          <p:cNvSpPr/>
+          <p:nvPr/>
+        </p:nvSpPr>
+        <p:spPr>
+          <a:xfrm>
+            <a:off x="6602819" y="4699591"/>
+            <a:ext cx="2541181" cy="329609"/>
+          </a:xfrm>
+          <a:prstGeom prst="rect">
+            <a:avLst/>
+          </a:prstGeom>
+          <a:solidFill>
+            <a:schemeClr val="bg1"/>
+          </a:solidFill>
+          <a:ln>
+            <a:noFill/>
+          </a:ln>
+        </p:spPr>
+        <p:style>
+          <a:lnRef idx="2">
+            <a:schemeClr val="accent6"/>
+          </a:lnRef>
+          <a:fillRef idx="1">
+            <a:schemeClr val="lt1"/>
+          </a:fillRef>
+          <a:effectRef idx="0">
+            <a:schemeClr val="accent6"/>
+          </a:effectRef>
+          <a:fontRef idx="minor">
+            <a:schemeClr val="dk1"/>
+          </a:fontRef>
+        </p:style>
+        <p:txBody>
+          <a:bodyPr rtlCol="0" anchor="ctr"/>
+          <a:lstStyle/>
+          <a:p>
+            <a:pPr algn="ctr"/>
+            <a:endParaRPr lang="en-IN"/>
+          </a:p>
+        </p:txBody>
+      </p:sp>
+      <p:pic>
+        <p:nvPicPr>
+          <p:cNvPr id="3" name="Picture 2"/>
+          <p:cNvPicPr>
+            <a:picLocks noChangeAspect="1"/>
+          </p:cNvPicPr>
+          <p:nvPr/>
+        </p:nvPicPr>
+        <p:blipFill>
+          <a:blip r:embed="rId2">
+            <a:extLst>
+              <a:ext uri="{28A0092B-C50C-407E-A947-70E740481C1C}">
+                <a14:useLocalDpi xmlns:a14="http://schemas.microsoft.com/office/drawing/2010/main" val="0"/>
+              </a:ext>
+            </a:extLst>
+          </a:blip>
+          <a:stretch>
+            <a:fillRect/>
+          </a:stretch>
+        </p:blipFill>
+        <p:spPr>
+          <a:xfrm>
+            <a:off x="0" y="637952"/>
+            <a:ext cx="9144000" cy="4505548"/>
+          </a:xfrm>
+          <a:prstGeom prst="rect">
+            <a:avLst/>
+          </a:prstGeom>
+        </p:spPr>
+      </p:pic>
+    </p:spTree>
+    <p:extLst>
+      <p:ext uri="{BB962C8B-B14F-4D97-AF65-F5344CB8AC3E}">
+        <p14:creationId xmlns:p14="http://schemas.microsoft.com/office/powerpoint/2010/main" val="1267898955"/>
+      </p:ext>
+    </p:extLst>
+  </p:cSld>
+  <p:clrMapOvr>
+    <a:masterClrMapping/>
+  </p:clrMapOvr>
+  <mc:AlternateContent xmlns:mc="http://schemas.openxmlformats.org/markup-compatibility/2006" xmlns:p14="http://schemas.microsoft.com/office/powerpoint/2010/main">
+    <mc:Choice Requires="p14">
+      <p:transition spd="med" p14:dur="700">
+        <p:fade/>
+      </p:transition>
+    </mc:Choice>
+    <mc:Fallback xmlns="">
+      <p:transition spd="med">
+        <p:fade/>
+      </p:transition>
+    </mc:Fallback>
+  </mc:AlternateContent>
+</p:sld>
+</file>
+
+<file path=ppt/slides/slide14.xml><?xml version="1.0" encoding="utf-8"?>
+<p:sld xmlns:a="http://schemas.openxmlformats.org/drawingml/2006/main" xmlns:r="http://schemas.openxmlformats.org/officeDocument/2006/relationships" xmlns:p="http://schemas.openxmlformats.org/presentationml/2006/main">
+  <p:cSld>
+    <p:spTree>
+      <p:nvGrpSpPr>
+        <p:cNvPr id="1" name=""/>
+        <p:cNvGrpSpPr/>
+        <p:nvPr/>
+      </p:nvGrpSpPr>
+      <p:grpSpPr>
+        <a:xfrm>
+          <a:off x="0" y="0"/>
+          <a:ext cx="0" cy="0"/>
+          <a:chOff x="0" y="0"/>
+          <a:chExt cx="0" cy="0"/>
+        </a:xfrm>
+      </p:grpSpPr>
       <p:pic>
         <p:nvPicPr>
           <p:cNvPr id="3" name="Picture 2"/>
@@ -7900,7 +8838,7 @@
 </p:sld>
 </file>
 
-<file path=ppt/slides/slide11.xml><?xml version="1.0" encoding="utf-8"?>
+<file path=ppt/slides/slide15.xml><?xml version="1.0" encoding="utf-8"?>
 <p:sld xmlns:a="http://schemas.openxmlformats.org/drawingml/2006/main" xmlns:r="http://schemas.openxmlformats.org/officeDocument/2006/relationships" xmlns:p="http://schemas.openxmlformats.org/presentationml/2006/main">
   <p:cSld>
     <p:spTree>
@@ -8061,7 +8999,7 @@
 </p:sld>
 </file>
 
-<file path=ppt/slides/slide12.xml><?xml version="1.0" encoding="utf-8"?>
+<file path=ppt/slides/slide16.xml><?xml version="1.0" encoding="utf-8"?>
 <p:sld xmlns:a="http://schemas.openxmlformats.org/drawingml/2006/main" xmlns:r="http://schemas.openxmlformats.org/officeDocument/2006/relationships" xmlns:p="http://schemas.openxmlformats.org/presentationml/2006/main">
   <p:cSld>
     <p:spTree>
@@ -8445,7 +9383,7 @@
 </p:sld>
 </file>
 
-<file path=ppt/slides/slide13.xml><?xml version="1.0" encoding="utf-8"?>
+<file path=ppt/slides/slide17.xml><?xml version="1.0" encoding="utf-8"?>
 <p:sld xmlns:a="http://schemas.openxmlformats.org/drawingml/2006/main" xmlns:r="http://schemas.openxmlformats.org/officeDocument/2006/relationships" xmlns:p="http://schemas.openxmlformats.org/presentationml/2006/main">
   <p:cSld>
     <p:spTree>
@@ -8953,7 +9891,7 @@
 </p:sld>
 </file>
 
-<file path=ppt/slides/slide14.xml><?xml version="1.0" encoding="utf-8"?>
+<file path=ppt/slides/slide18.xml><?xml version="1.0" encoding="utf-8"?>
 <p:sld xmlns:a="http://schemas.openxmlformats.org/drawingml/2006/main" xmlns:r="http://schemas.openxmlformats.org/officeDocument/2006/relationships" xmlns:p="http://schemas.openxmlformats.org/presentationml/2006/main">
   <p:cSld>
     <p:spTree>
@@ -9034,7 +9972,7 @@
 </p:sld>
 </file>
 
-<file path=ppt/slides/slide15.xml><?xml version="1.0" encoding="utf-8"?>
+<file path=ppt/slides/slide19.xml><?xml version="1.0" encoding="utf-8"?>
 <p:sld xmlns:a="http://schemas.openxmlformats.org/drawingml/2006/main" xmlns:r="http://schemas.openxmlformats.org/officeDocument/2006/relationships" xmlns:p="http://schemas.openxmlformats.org/presentationml/2006/main">
   <p:cSld>
     <p:spTree>
@@ -12512,303 +13450,6 @@
         </p:nvSpPr>
         <p:spPr>
           <a:xfrm>
-            <a:off x="178667" y="152026"/>
-            <a:ext cx="7886700" cy="994172"/>
-          </a:xfrm>
-        </p:spPr>
-        <p:txBody>
-          <a:bodyPr>
-            <a:normAutofit/>
-          </a:bodyPr>
-          <a:lstStyle/>
-          <a:p>
-            <a:r>
-              <a:rPr lang="en-US" sz="3200" dirty="0">
-                <a:solidFill>
-                  <a:schemeClr val="tx1"/>
-                </a:solidFill>
-              </a:rPr>
-              <a:t>Centralized Version Controlling Systems</a:t>
-            </a:r>
-          </a:p>
-        </p:txBody>
-      </p:sp>
-      <p:sp>
-        <p:nvSpPr>
-          <p:cNvPr id="3" name="Content Placeholder 2">
-            <a:extLst>
-              <a:ext uri="{FF2B5EF4-FFF2-40B4-BE49-F238E27FC236}">
-                <a16:creationId xmlns:a16="http://schemas.microsoft.com/office/drawing/2014/main" id="{FC5CC17A-2D88-4317-B875-A7B2564708D1}"/>
-              </a:ext>
-            </a:extLst>
-          </p:cNvPr>
-          <p:cNvSpPr>
-            <a:spLocks noGrp="1"/>
-          </p:cNvSpPr>
-          <p:nvPr>
-            <p:ph idx="1"/>
-          </p:nvPr>
-        </p:nvSpPr>
-        <p:spPr/>
-        <p:txBody>
-          <a:bodyPr/>
-          <a:lstStyle/>
-          <a:p>
-            <a:pPr marL="0" indent="0">
-              <a:buNone/>
-            </a:pPr>
-            <a:r>
-              <a:rPr lang="en-US" dirty="0"/>
-              <a:t> </a:t>
-            </a:r>
-          </a:p>
-        </p:txBody>
-      </p:sp>
-      <p:pic>
-        <p:nvPicPr>
-          <p:cNvPr id="5" name="Picture 4">
-            <a:extLst>
-              <a:ext uri="{FF2B5EF4-FFF2-40B4-BE49-F238E27FC236}">
-                <a16:creationId xmlns:a16="http://schemas.microsoft.com/office/drawing/2014/main" id="{C66299B7-96C2-46B2-A773-60B90A036CD4}"/>
-              </a:ext>
-            </a:extLst>
-          </p:cNvPr>
-          <p:cNvPicPr>
-            <a:picLocks noChangeAspect="1"/>
-          </p:cNvPicPr>
-          <p:nvPr/>
-        </p:nvPicPr>
-        <p:blipFill>
-          <a:blip r:embed="rId2"/>
-          <a:stretch>
-            <a:fillRect/>
-          </a:stretch>
-        </p:blipFill>
-        <p:spPr>
-          <a:xfrm>
-            <a:off x="1198545" y="1146198"/>
-            <a:ext cx="6313601" cy="2695193"/>
-          </a:xfrm>
-          <a:prstGeom prst="rect">
-            <a:avLst/>
-          </a:prstGeom>
-        </p:spPr>
-      </p:pic>
-      <p:pic>
-        <p:nvPicPr>
-          <p:cNvPr id="7" name="Picture 6" descr="A picture containing drawing&#10;&#10;Description automatically generated">
-            <a:extLst>
-              <a:ext uri="{FF2B5EF4-FFF2-40B4-BE49-F238E27FC236}">
-                <a16:creationId xmlns:a16="http://schemas.microsoft.com/office/drawing/2014/main" id="{8B15E3F1-D68D-4CAD-B08F-0827C2697AFE}"/>
-              </a:ext>
-            </a:extLst>
-          </p:cNvPr>
-          <p:cNvPicPr>
-            <a:picLocks noChangeAspect="1"/>
-          </p:cNvPicPr>
-          <p:nvPr/>
-        </p:nvPicPr>
-        <p:blipFill>
-          <a:blip r:embed="rId3">
-            <a:extLst>
-              <a:ext uri="{28A0092B-C50C-407E-A947-70E740481C1C}">
-                <a14:useLocalDpi xmlns:a14="http://schemas.microsoft.com/office/drawing/2010/main" val="0"/>
-              </a:ext>
-            </a:extLst>
-          </a:blip>
-          <a:stretch>
-            <a:fillRect/>
-          </a:stretch>
-        </p:blipFill>
-        <p:spPr>
-          <a:xfrm>
-            <a:off x="7417191" y="3669087"/>
-            <a:ext cx="1489812" cy="1302109"/>
-          </a:xfrm>
-          <a:prstGeom prst="rect">
-            <a:avLst/>
-          </a:prstGeom>
-        </p:spPr>
-      </p:pic>
-      <p:pic>
-        <p:nvPicPr>
-          <p:cNvPr id="11" name="Picture 10" descr="A picture containing drawing&#10;&#10;Description automatically generated">
-            <a:extLst>
-              <a:ext uri="{FF2B5EF4-FFF2-40B4-BE49-F238E27FC236}">
-                <a16:creationId xmlns:a16="http://schemas.microsoft.com/office/drawing/2014/main" id="{0F55A489-5795-4C83-8F62-940408AB65F9}"/>
-              </a:ext>
-            </a:extLst>
-          </p:cNvPr>
-          <p:cNvPicPr>
-            <a:picLocks noChangeAspect="1"/>
-          </p:cNvPicPr>
-          <p:nvPr/>
-        </p:nvPicPr>
-        <p:blipFill>
-          <a:blip r:embed="rId4">
-            <a:extLst>
-              <a:ext uri="{28A0092B-C50C-407E-A947-70E740481C1C}">
-                <a14:useLocalDpi xmlns:a14="http://schemas.microsoft.com/office/drawing/2010/main" val="0"/>
-              </a:ext>
-            </a:extLst>
-          </a:blip>
-          <a:stretch>
-            <a:fillRect/>
-          </a:stretch>
-        </p:blipFill>
-        <p:spPr>
-          <a:xfrm>
-            <a:off x="5986357" y="4027279"/>
-            <a:ext cx="1205184" cy="1116221"/>
-          </a:xfrm>
-          <a:prstGeom prst="rect">
-            <a:avLst/>
-          </a:prstGeom>
-        </p:spPr>
-      </p:pic>
-    </p:spTree>
-    <p:extLst>
-      <p:ext uri="{BB962C8B-B14F-4D97-AF65-F5344CB8AC3E}">
-        <p14:creationId xmlns:p14="http://schemas.microsoft.com/office/powerpoint/2010/main" val="1719771694"/>
-      </p:ext>
-    </p:extLst>
-  </p:cSld>
-  <p:clrMapOvr>
-    <a:masterClrMapping/>
-  </p:clrMapOvr>
-  <mc:AlternateContent xmlns:mc="http://schemas.openxmlformats.org/markup-compatibility/2006" xmlns:p14="http://schemas.microsoft.com/office/powerpoint/2010/main">
-    <mc:Choice Requires="p14">
-      <p:transition spd="med" p14:dur="700">
-        <p:fade/>
-      </p:transition>
-    </mc:Choice>
-    <mc:Fallback xmlns="">
-      <p:transition spd="med">
-        <p:fade/>
-      </p:transition>
-    </mc:Fallback>
-  </mc:AlternateContent>
-  <p:timing>
-    <p:tnLst>
-      <p:par>
-        <p:cTn id="1" dur="indefinite" restart="never" nodeType="tmRoot">
-          <p:childTnLst>
-            <p:seq concurrent="1" nextAc="seek">
-              <p:cTn id="2" dur="indefinite" nodeType="mainSeq">
-                <p:childTnLst>
-                  <p:par>
-                    <p:cTn id="3" fill="hold">
-                      <p:stCondLst>
-                        <p:cond delay="indefinite"/>
-                      </p:stCondLst>
-                      <p:childTnLst>
-                        <p:par>
-                          <p:cTn id="4" fill="hold">
-                            <p:stCondLst>
-                              <p:cond delay="0"/>
-                            </p:stCondLst>
-                            <p:childTnLst>
-                              <p:par>
-                                <p:cTn id="5" presetID="14" presetClass="entr" presetSubtype="10" fill="hold" nodeType="clickEffect">
-                                  <p:stCondLst>
-                                    <p:cond delay="0"/>
-                                  </p:stCondLst>
-                                  <p:childTnLst>
-                                    <p:set>
-                                      <p:cBhvr>
-                                        <p:cTn id="6" dur="1" fill="hold">
-                                          <p:stCondLst>
-                                            <p:cond delay="0"/>
-                                          </p:stCondLst>
-                                        </p:cTn>
-                                        <p:tgtEl>
-                                          <p:spTgt spid="5"/>
-                                        </p:tgtEl>
-                                        <p:attrNameLst>
-                                          <p:attrName>style.visibility</p:attrName>
-                                        </p:attrNameLst>
-                                      </p:cBhvr>
-                                      <p:to>
-                                        <p:strVal val="visible"/>
-                                      </p:to>
-                                    </p:set>
-                                    <p:animEffect transition="in" filter="randombar(horizontal)">
-                                      <p:cBhvr>
-                                        <p:cTn id="7" dur="2000"/>
-                                        <p:tgtEl>
-                                          <p:spTgt spid="5"/>
-                                        </p:tgtEl>
-                                      </p:cBhvr>
-                                    </p:animEffect>
-                                  </p:childTnLst>
-                                </p:cTn>
-                              </p:par>
-                            </p:childTnLst>
-                          </p:cTn>
-                        </p:par>
-                      </p:childTnLst>
-                    </p:cTn>
-                  </p:par>
-                </p:childTnLst>
-              </p:cTn>
-              <p:prevCondLst>
-                <p:cond evt="onPrev" delay="0">
-                  <p:tgtEl>
-                    <p:sldTgt/>
-                  </p:tgtEl>
-                </p:cond>
-              </p:prevCondLst>
-              <p:nextCondLst>
-                <p:cond evt="onNext" delay="0">
-                  <p:tgtEl>
-                    <p:sldTgt/>
-                  </p:tgtEl>
-                </p:cond>
-              </p:nextCondLst>
-            </p:seq>
-          </p:childTnLst>
-        </p:cTn>
-      </p:par>
-    </p:tnLst>
-  </p:timing>
-</p:sld>
-</file>
-
-<file path=ppt/slides/slide6.xml><?xml version="1.0" encoding="utf-8"?>
-<p:sld xmlns:a="http://schemas.openxmlformats.org/drawingml/2006/main" xmlns:r="http://schemas.openxmlformats.org/officeDocument/2006/relationships" xmlns:p="http://schemas.openxmlformats.org/presentationml/2006/main">
-  <p:cSld>
-    <p:spTree>
-      <p:nvGrpSpPr>
-        <p:cNvPr id="1" name=""/>
-        <p:cNvGrpSpPr/>
-        <p:nvPr/>
-      </p:nvGrpSpPr>
-      <p:grpSpPr>
-        <a:xfrm>
-          <a:off x="0" y="0"/>
-          <a:ext cx="0" cy="0"/>
-          <a:chOff x="0" y="0"/>
-          <a:chExt cx="0" cy="0"/>
-        </a:xfrm>
-      </p:grpSpPr>
-      <p:sp>
-        <p:nvSpPr>
-          <p:cNvPr id="2" name="Title 1">
-            <a:extLst>
-              <a:ext uri="{FF2B5EF4-FFF2-40B4-BE49-F238E27FC236}">
-                <a16:creationId xmlns:a16="http://schemas.microsoft.com/office/drawing/2014/main" id="{406663AA-EBB5-4E73-A044-136A31C1D645}"/>
-              </a:ext>
-            </a:extLst>
-          </p:cNvPr>
-          <p:cNvSpPr>
-            <a:spLocks noGrp="1"/>
-          </p:cNvSpPr>
-          <p:nvPr>
-            <p:ph type="title"/>
-          </p:nvPr>
-        </p:nvSpPr>
-        <p:spPr>
-          <a:xfrm>
             <a:off x="270431" y="13792"/>
             <a:ext cx="7886700" cy="994172"/>
           </a:xfrm>
@@ -12883,80 +13524,8 @@
         </p:blipFill>
         <p:spPr>
           <a:xfrm>
-            <a:off x="1744428" y="877762"/>
-            <a:ext cx="4005923" cy="3407143"/>
-          </a:xfrm>
-          <a:prstGeom prst="rect">
-            <a:avLst/>
-          </a:prstGeom>
-        </p:spPr>
-      </p:pic>
-      <p:pic>
-        <p:nvPicPr>
-          <p:cNvPr id="8" name="Picture 7" descr="A picture containing drawing&#10;&#10;Description automatically generated">
-            <a:extLst>
-              <a:ext uri="{FF2B5EF4-FFF2-40B4-BE49-F238E27FC236}">
-                <a16:creationId xmlns:a16="http://schemas.microsoft.com/office/drawing/2014/main" id="{C12DE027-99E9-47C0-8B39-31F5FD14B673}"/>
-              </a:ext>
-            </a:extLst>
-          </p:cNvPr>
-          <p:cNvPicPr>
-            <a:picLocks noChangeAspect="1"/>
-          </p:cNvPicPr>
-          <p:nvPr/>
-        </p:nvPicPr>
-        <p:blipFill>
-          <a:blip r:embed="rId3">
-            <a:extLst>
-              <a:ext uri="{28A0092B-C50C-407E-A947-70E740481C1C}">
-                <a14:useLocalDpi xmlns:a14="http://schemas.microsoft.com/office/drawing/2010/main" val="0"/>
-              </a:ext>
-            </a:extLst>
-          </a:blip>
-          <a:stretch>
-            <a:fillRect/>
-          </a:stretch>
-        </p:blipFill>
-        <p:spPr>
-          <a:xfrm>
-            <a:off x="5883275" y="3989070"/>
-            <a:ext cx="1154430" cy="1154430"/>
-          </a:xfrm>
-          <a:prstGeom prst="rect">
-            <a:avLst/>
-          </a:prstGeom>
-        </p:spPr>
-      </p:pic>
-      <p:pic>
-        <p:nvPicPr>
-          <p:cNvPr id="10" name="Picture 9" descr="A picture containing drawing&#10;&#10;Description automatically generated">
-            <a:extLst>
-              <a:ext uri="{FF2B5EF4-FFF2-40B4-BE49-F238E27FC236}">
-                <a16:creationId xmlns:a16="http://schemas.microsoft.com/office/drawing/2014/main" id="{EACCBE2A-AF41-4343-8005-FC5D7942436F}"/>
-              </a:ext>
-            </a:extLst>
-          </p:cNvPr>
-          <p:cNvPicPr>
-            <a:picLocks noChangeAspect="1"/>
-          </p:cNvPicPr>
-          <p:nvPr/>
-        </p:nvPicPr>
-        <p:blipFill>
-          <a:blip r:embed="rId4">
-            <a:extLst>
-              <a:ext uri="{28A0092B-C50C-407E-A947-70E740481C1C}">
-                <a14:useLocalDpi xmlns:a14="http://schemas.microsoft.com/office/drawing/2010/main" val="0"/>
-              </a:ext>
-            </a:extLst>
-          </a:blip>
-          <a:stretch>
-            <a:fillRect/>
-          </a:stretch>
-        </p:blipFill>
-        <p:spPr>
-          <a:xfrm>
-            <a:off x="7274225" y="3737613"/>
-            <a:ext cx="1609761" cy="1327071"/>
+            <a:off x="1179651" y="924827"/>
+            <a:ext cx="4556911" cy="3875773"/>
           </a:xfrm>
           <a:prstGeom prst="rect">
             <a:avLst/>
@@ -12966,7 +13535,7 @@
     </p:spTree>
     <p:extLst>
       <p:ext uri="{BB962C8B-B14F-4D97-AF65-F5344CB8AC3E}">
-        <p14:creationId xmlns:p14="http://schemas.microsoft.com/office/powerpoint/2010/main" val="1446209494"/>
+        <p14:creationId xmlns:p14="http://schemas.microsoft.com/office/powerpoint/2010/main" val="3500985739"/>
       </p:ext>
     </p:extLst>
   </p:cSld>
@@ -13109,6 +13678,118 @@
 </p:sld>
 </file>
 
+<file path=ppt/slides/slide6.xml><?xml version="1.0" encoding="utf-8"?>
+<p:sld xmlns:a="http://schemas.openxmlformats.org/drawingml/2006/main" xmlns:r="http://schemas.openxmlformats.org/officeDocument/2006/relationships" xmlns:p="http://schemas.openxmlformats.org/presentationml/2006/main">
+  <p:cSld>
+    <p:spTree>
+      <p:nvGrpSpPr>
+        <p:cNvPr id="1" name=""/>
+        <p:cNvGrpSpPr/>
+        <p:nvPr/>
+      </p:nvGrpSpPr>
+      <p:grpSpPr>
+        <a:xfrm>
+          <a:off x="0" y="0"/>
+          <a:ext cx="0" cy="0"/>
+          <a:chOff x="0" y="0"/>
+          <a:chExt cx="0" cy="0"/>
+        </a:xfrm>
+      </p:grpSpPr>
+      <p:sp>
+        <p:nvSpPr>
+          <p:cNvPr id="2" name="Title 1">
+            <a:extLst>
+              <a:ext uri="{FF2B5EF4-FFF2-40B4-BE49-F238E27FC236}">
+                <a16:creationId xmlns:a16="http://schemas.microsoft.com/office/drawing/2014/main" id="{F6B64E3F-6AC1-476A-AF5B-4A7765457610}"/>
+              </a:ext>
+            </a:extLst>
+          </p:cNvPr>
+          <p:cNvSpPr>
+            <a:spLocks noGrp="1"/>
+          </p:cNvSpPr>
+          <p:nvPr>
+            <p:ph type="title"/>
+          </p:nvPr>
+        </p:nvSpPr>
+        <p:spPr/>
+        <p:txBody>
+          <a:bodyPr/>
+          <a:lstStyle/>
+          <a:p>
+            <a:r>
+              <a:rPr lang="en-US" sz="2800" dirty="0">
+                <a:solidFill>
+                  <a:schemeClr val="tx1"/>
+                </a:solidFill>
+              </a:rPr>
+              <a:t>Centralized</a:t>
+            </a:r>
+            <a:r>
+              <a:rPr lang="en-US" dirty="0">
+                <a:solidFill>
+                  <a:schemeClr val="tx1"/>
+                </a:solidFill>
+              </a:rPr>
+              <a:t> Version Control System</a:t>
+            </a:r>
+          </a:p>
+        </p:txBody>
+      </p:sp>
+      <p:pic>
+        <p:nvPicPr>
+          <p:cNvPr id="5" name="Picture 4">
+            <a:extLst>
+              <a:ext uri="{FF2B5EF4-FFF2-40B4-BE49-F238E27FC236}">
+                <a16:creationId xmlns:a16="http://schemas.microsoft.com/office/drawing/2014/main" id="{B271B5E4-A470-4ECB-AA5F-13922C150618}"/>
+              </a:ext>
+            </a:extLst>
+          </p:cNvPr>
+          <p:cNvPicPr>
+            <a:picLocks noChangeAspect="1"/>
+          </p:cNvPicPr>
+          <p:nvPr/>
+        </p:nvPicPr>
+        <p:blipFill>
+          <a:blip r:embed="rId2"/>
+          <a:stretch>
+            <a:fillRect/>
+          </a:stretch>
+        </p:blipFill>
+        <p:spPr>
+          <a:xfrm>
+            <a:off x="1183340" y="1258817"/>
+            <a:ext cx="5221855" cy="3629189"/>
+          </a:xfrm>
+          <a:prstGeom prst="rect">
+            <a:avLst/>
+          </a:prstGeom>
+        </p:spPr>
+      </p:pic>
+    </p:spTree>
+    <p:extLst>
+      <p:ext uri="{BB962C8B-B14F-4D97-AF65-F5344CB8AC3E}">
+        <p14:creationId xmlns:p14="http://schemas.microsoft.com/office/powerpoint/2010/main" val="116038154"/>
+      </p:ext>
+    </p:extLst>
+  </p:cSld>
+  <p:clrMapOvr>
+    <a:masterClrMapping/>
+  </p:clrMapOvr>
+  <mc:AlternateContent xmlns:mc="http://schemas.openxmlformats.org/markup-compatibility/2006" xmlns:p14="http://schemas.microsoft.com/office/powerpoint/2010/main">
+    <mc:Choice Requires="p14">
+      <p:transition spd="med" p14:dur="700">
+        <p:fade/>
+      </p:transition>
+    </mc:Choice>
+    <mc:Fallback xmlns="">
+      <p:transition spd="med">
+        <p:fade/>
+      </p:transition>
+    </mc:Fallback>
+  </mc:AlternateContent>
+</p:sld>
+</file>
+
 <file path=ppt/slides/slide7.xml><?xml version="1.0" encoding="utf-8"?>
 <p:sld xmlns:a="http://schemas.openxmlformats.org/drawingml/2006/main" xmlns:r="http://schemas.openxmlformats.org/officeDocument/2006/relationships" xmlns:p="http://schemas.openxmlformats.org/presentationml/2006/main">
   <p:cSld>
@@ -13131,7 +13812,7 @@
           <p:cNvPr id="2" name="Title 1">
             <a:extLst>
               <a:ext uri="{FF2B5EF4-FFF2-40B4-BE49-F238E27FC236}">
-                <a16:creationId xmlns:a16="http://schemas.microsoft.com/office/drawing/2014/main" id="{406663AA-EBB5-4E73-A044-136A31C1D645}"/>
+                <a16:creationId xmlns:a16="http://schemas.microsoft.com/office/drawing/2014/main" id="{D9A23398-8152-4C33-B3B7-203F4EE2589C}"/>
               </a:ext>
             </a:extLst>
           </p:cNvPr>
@@ -13144,13 +13825,13 @@
         </p:nvSpPr>
         <p:spPr>
           <a:xfrm>
-            <a:off x="270431" y="57010"/>
-            <a:ext cx="7886700" cy="974852"/>
+            <a:off x="158379" y="1725706"/>
+            <a:ext cx="6447501" cy="990600"/>
           </a:xfrm>
         </p:spPr>
         <p:txBody>
           <a:bodyPr>
-            <a:normAutofit/>
+            <a:noAutofit/>
           </a:bodyPr>
           <a:lstStyle/>
           <a:p>
@@ -13160,17 +13841,32 @@
                   <a:schemeClr val="tx1"/>
                 </a:solidFill>
               </a:rPr>
-              <a:t>Contributor vs Collaborator </a:t>
+              <a:t>Distributed Version Control </a:t>
+            </a:r>
+            <a:br>
+              <a:rPr lang="en-US" sz="3200" dirty="0">
+                <a:solidFill>
+                  <a:schemeClr val="tx1"/>
+                </a:solidFill>
+              </a:rPr>
+            </a:br>
+            <a:r>
+              <a:rPr lang="en-US" sz="3200" dirty="0">
+                <a:solidFill>
+                  <a:schemeClr val="tx1"/>
+                </a:solidFill>
+              </a:rPr>
+              <a:t>System</a:t>
             </a:r>
           </a:p>
         </p:txBody>
       </p:sp>
       <p:pic>
         <p:nvPicPr>
-          <p:cNvPr id="8" name="Picture 7" descr="A picture containing drawing&#10;&#10;Description automatically generated">
+          <p:cNvPr id="5" name="Picture 4">
             <a:extLst>
               <a:ext uri="{FF2B5EF4-FFF2-40B4-BE49-F238E27FC236}">
-                <a16:creationId xmlns:a16="http://schemas.microsoft.com/office/drawing/2014/main" id="{C12DE027-99E9-47C0-8B39-31F5FD14B673}"/>
+                <a16:creationId xmlns:a16="http://schemas.microsoft.com/office/drawing/2014/main" id="{A66CEC8F-A7FB-4791-8825-79A20B9BD286}"/>
               </a:ext>
             </a:extLst>
           </p:cNvPr>
@@ -13180,21 +13876,15 @@
           <p:nvPr/>
         </p:nvPicPr>
         <p:blipFill>
-          <a:blip r:embed="rId2">
-            <a:extLst>
-              <a:ext uri="{28A0092B-C50C-407E-A947-70E740481C1C}">
-                <a14:useLocalDpi xmlns:a14="http://schemas.microsoft.com/office/drawing/2010/main" val="0"/>
-              </a:ext>
-            </a:extLst>
-          </a:blip>
+          <a:blip r:embed="rId2"/>
           <a:stretch>
             <a:fillRect/>
           </a:stretch>
         </p:blipFill>
         <p:spPr>
           <a:xfrm>
-            <a:off x="2430627" y="2668402"/>
-            <a:ext cx="1920656" cy="1920656"/>
+            <a:off x="3945500" y="0"/>
+            <a:ext cx="5144712" cy="5002306"/>
           </a:xfrm>
           <a:prstGeom prst="rect">
             <a:avLst/>
@@ -13203,10 +13893,10 @@
       </p:pic>
       <p:pic>
         <p:nvPicPr>
-          <p:cNvPr id="10" name="Picture 9" descr="A picture containing drawing&#10;&#10;Description automatically generated">
+          <p:cNvPr id="6" name="Picture 5" descr="A picture containing drawing&#10;&#10;Description automatically generated">
             <a:extLst>
               <a:ext uri="{FF2B5EF4-FFF2-40B4-BE49-F238E27FC236}">
-                <a16:creationId xmlns:a16="http://schemas.microsoft.com/office/drawing/2014/main" id="{EACCBE2A-AF41-4343-8005-FC5D7942436F}"/>
+                <a16:creationId xmlns:a16="http://schemas.microsoft.com/office/drawing/2014/main" id="{A5CB9E51-ADD2-4BA3-AF26-7FAC9E42B7A1}"/>
               </a:ext>
             </a:extLst>
           </p:cNvPr>
@@ -13229,119 +13919,54 @@
         </p:blipFill>
         <p:spPr>
           <a:xfrm>
-            <a:off x="4847176" y="2791671"/>
-            <a:ext cx="2002941" cy="1651205"/>
+            <a:off x="0" y="1807"/>
+            <a:ext cx="772279" cy="772279"/>
           </a:xfrm>
           <a:prstGeom prst="rect">
             <a:avLst/>
           </a:prstGeom>
         </p:spPr>
       </p:pic>
-      <p:sp>
-        <p:nvSpPr>
-          <p:cNvPr id="12" name="Rectangle 11">
+      <p:pic>
+        <p:nvPicPr>
+          <p:cNvPr id="7" name="Picture 6" descr="A picture containing drawing&#10;&#10;Description automatically generated">
             <a:extLst>
               <a:ext uri="{FF2B5EF4-FFF2-40B4-BE49-F238E27FC236}">
-                <a16:creationId xmlns:a16="http://schemas.microsoft.com/office/drawing/2014/main" id="{6A78E89C-2A9B-46D3-9BBF-5C06BB3C5815}"/>
+                <a16:creationId xmlns:a16="http://schemas.microsoft.com/office/drawing/2014/main" id="{63FD6272-A019-4AD1-AC4B-58B1B1F97E50}"/>
               </a:ext>
             </a:extLst>
           </p:cNvPr>
-          <p:cNvSpPr/>
+          <p:cNvPicPr>
+            <a:picLocks noChangeAspect="1"/>
+          </p:cNvPicPr>
           <p:nvPr/>
-        </p:nvSpPr>
+        </p:nvPicPr>
+        <p:blipFill>
+          <a:blip r:embed="rId4">
+            <a:extLst>
+              <a:ext uri="{28A0092B-C50C-407E-A947-70E740481C1C}">
+                <a14:useLocalDpi xmlns:a14="http://schemas.microsoft.com/office/drawing/2010/main" val="0"/>
+              </a:ext>
+            </a:extLst>
+          </a:blip>
+          <a:stretch>
+            <a:fillRect/>
+          </a:stretch>
+        </p:blipFill>
         <p:spPr>
           <a:xfrm>
-            <a:off x="402021" y="1024758"/>
-            <a:ext cx="8371489" cy="1477328"/>
+            <a:off x="8250697" y="-13515"/>
+            <a:ext cx="893303" cy="787601"/>
           </a:xfrm>
           <a:prstGeom prst="rect">
             <a:avLst/>
           </a:prstGeom>
         </p:spPr>
-        <p:txBody>
-          <a:bodyPr wrap="square">
-            <a:spAutoFit/>
-          </a:bodyPr>
-          <a:lstStyle/>
-          <a:p>
-            <a:pPr marL="285750" indent="-285750" algn="just">
-              <a:buFont typeface="Arial" panose="020B0604020202020204" pitchFamily="34" charset="0"/>
-              <a:buChar char="•"/>
-            </a:pPr>
-            <a:r>
-              <a:rPr lang="en-US" b="1" dirty="0">
-                <a:latin typeface="arial" panose="020B0604020202020204" pitchFamily="34" charset="0"/>
-              </a:rPr>
-              <a:t>Contributor</a:t>
-            </a:r>
-            <a:r>
-              <a:rPr lang="en-US" dirty="0">
-                <a:latin typeface="arial" panose="020B0604020202020204" pitchFamily="34" charset="0"/>
-              </a:rPr>
-              <a:t>: A </a:t>
-            </a:r>
-            <a:r>
-              <a:rPr lang="en-US" b="1" dirty="0">
-                <a:latin typeface="arial" panose="020B0604020202020204" pitchFamily="34" charset="0"/>
-              </a:rPr>
-              <a:t>contributor</a:t>
-            </a:r>
-            <a:r>
-              <a:rPr lang="en-US" dirty="0">
-                <a:latin typeface="arial" panose="020B0604020202020204" pitchFamily="34" charset="0"/>
-              </a:rPr>
-              <a:t> is someone from the outside not on the core development team of the project that wants to contribute some changes to a project.</a:t>
-            </a:r>
-          </a:p>
-          <a:p>
-            <a:pPr marL="285750" indent="-285750" algn="just">
-              <a:buFont typeface="Arial" panose="020B0604020202020204" pitchFamily="34" charset="0"/>
-              <a:buChar char="•"/>
-            </a:pPr>
-            <a:r>
-              <a:rPr lang="en-US" b="1" dirty="0">
-                <a:latin typeface="arial" panose="020B0604020202020204" pitchFamily="34" charset="0"/>
-              </a:rPr>
-              <a:t>*** Collaborator</a:t>
-            </a:r>
-            <a:r>
-              <a:rPr lang="en-US" dirty="0">
-                <a:latin typeface="arial" panose="020B0604020202020204" pitchFamily="34" charset="0"/>
-              </a:rPr>
-              <a:t>: A </a:t>
-            </a:r>
-            <a:r>
-              <a:rPr lang="en-US" b="1" dirty="0">
-                <a:latin typeface="arial" panose="020B0604020202020204" pitchFamily="34" charset="0"/>
-              </a:rPr>
-              <a:t>collaborator</a:t>
-            </a:r>
-            <a:r>
-              <a:rPr lang="en-US" dirty="0">
-                <a:latin typeface="arial" panose="020B0604020202020204" pitchFamily="34" charset="0"/>
-              </a:rPr>
-              <a:t> is someone on the core development team of the project </a:t>
-            </a:r>
-            <a:r>
-              <a:rPr lang="en-US" b="1" dirty="0">
-                <a:latin typeface="arial" panose="020B0604020202020204" pitchFamily="34" charset="0"/>
-              </a:rPr>
-              <a:t>and</a:t>
-            </a:r>
-            <a:r>
-              <a:rPr lang="en-US" dirty="0">
-                <a:latin typeface="arial" panose="020B0604020202020204" pitchFamily="34" charset="0"/>
-              </a:rPr>
-              <a:t> has commit access to the main repository of the project.</a:t>
-            </a:r>
-            <a:endParaRPr lang="en-IN" dirty="0"/>
-          </a:p>
-        </p:txBody>
-      </p:sp>
+      </p:pic>
     </p:spTree>
     <p:extLst>
       <p:ext uri="{BB962C8B-B14F-4D97-AF65-F5344CB8AC3E}">
-        <p14:creationId xmlns:p14="http://schemas.microsoft.com/office/powerpoint/2010/main" val="4153876519"/>
+        <p14:creationId xmlns:p14="http://schemas.microsoft.com/office/powerpoint/2010/main" val="1395513108"/>
       </p:ext>
     </p:extLst>
   </p:cSld>
@@ -13360,266 +13985,6 @@
       </p:transition>
     </mc:Fallback>
   </mc:AlternateContent>
-  <p:timing>
-    <p:tnLst>
-      <p:par>
-        <p:cTn id="1" dur="indefinite" restart="never" nodeType="tmRoot">
-          <p:childTnLst>
-            <p:seq concurrent="1" nextAc="seek">
-              <p:cTn id="2" dur="indefinite" nodeType="mainSeq">
-                <p:childTnLst>
-                  <p:par>
-                    <p:cTn id="3" fill="hold">
-                      <p:stCondLst>
-                        <p:cond delay="indefinite"/>
-                      </p:stCondLst>
-                      <p:childTnLst>
-                        <p:par>
-                          <p:cTn id="4" fill="hold">
-                            <p:stCondLst>
-                              <p:cond delay="0"/>
-                            </p:stCondLst>
-                            <p:childTnLst>
-                              <p:par>
-                                <p:cTn id="5" presetID="42" presetClass="entr" presetSubtype="0" fill="hold" nodeType="clickEffect">
-                                  <p:stCondLst>
-                                    <p:cond delay="0"/>
-                                  </p:stCondLst>
-                                  <p:childTnLst>
-                                    <p:set>
-                                      <p:cBhvr>
-                                        <p:cTn id="6" dur="1" fill="hold">
-                                          <p:stCondLst>
-                                            <p:cond delay="0"/>
-                                          </p:stCondLst>
-                                        </p:cTn>
-                                        <p:tgtEl>
-                                          <p:spTgt spid="12">
-                                            <p:txEl>
-                                              <p:pRg st="0" end="0"/>
-                                            </p:txEl>
-                                          </p:spTgt>
-                                        </p:tgtEl>
-                                        <p:attrNameLst>
-                                          <p:attrName>style.visibility</p:attrName>
-                                        </p:attrNameLst>
-                                      </p:cBhvr>
-                                      <p:to>
-                                        <p:strVal val="visible"/>
-                                      </p:to>
-                                    </p:set>
-                                    <p:animEffect transition="in" filter="fade">
-                                      <p:cBhvr>
-                                        <p:cTn id="7" dur="1000"/>
-                                        <p:tgtEl>
-                                          <p:spTgt spid="12">
-                                            <p:txEl>
-                                              <p:pRg st="0" end="0"/>
-                                            </p:txEl>
-                                          </p:spTgt>
-                                        </p:tgtEl>
-                                      </p:cBhvr>
-                                    </p:animEffect>
-                                    <p:anim calcmode="lin" valueType="num">
-                                      <p:cBhvr>
-                                        <p:cTn id="8" dur="1000" fill="hold"/>
-                                        <p:tgtEl>
-                                          <p:spTgt spid="12">
-                                            <p:txEl>
-                                              <p:pRg st="0" end="0"/>
-                                            </p:txEl>
-                                          </p:spTgt>
-                                        </p:tgtEl>
-                                        <p:attrNameLst>
-                                          <p:attrName>ppt_x</p:attrName>
-                                        </p:attrNameLst>
-                                      </p:cBhvr>
-                                      <p:tavLst>
-                                        <p:tav tm="0">
-                                          <p:val>
-                                            <p:strVal val="#ppt_x"/>
-                                          </p:val>
-                                        </p:tav>
-                                        <p:tav tm="100000">
-                                          <p:val>
-                                            <p:strVal val="#ppt_x"/>
-                                          </p:val>
-                                        </p:tav>
-                                      </p:tavLst>
-                                    </p:anim>
-                                    <p:anim calcmode="lin" valueType="num">
-                                      <p:cBhvr>
-                                        <p:cTn id="9" dur="1000" fill="hold"/>
-                                        <p:tgtEl>
-                                          <p:spTgt spid="12">
-                                            <p:txEl>
-                                              <p:pRg st="0" end="0"/>
-                                            </p:txEl>
-                                          </p:spTgt>
-                                        </p:tgtEl>
-                                        <p:attrNameLst>
-                                          <p:attrName>ppt_y</p:attrName>
-                                        </p:attrNameLst>
-                                      </p:cBhvr>
-                                      <p:tavLst>
-                                        <p:tav tm="0">
-                                          <p:val>
-                                            <p:strVal val="#ppt_y+.1"/>
-                                          </p:val>
-                                        </p:tav>
-                                        <p:tav tm="100000">
-                                          <p:val>
-                                            <p:strVal val="#ppt_y"/>
-                                          </p:val>
-                                        </p:tav>
-                                      </p:tavLst>
-                                    </p:anim>
-                                  </p:childTnLst>
-                                </p:cTn>
-                              </p:par>
-                            </p:childTnLst>
-                          </p:cTn>
-                        </p:par>
-                      </p:childTnLst>
-                    </p:cTn>
-                  </p:par>
-                  <p:par>
-                    <p:cTn id="10" fill="hold">
-                      <p:stCondLst>
-                        <p:cond delay="indefinite"/>
-                      </p:stCondLst>
-                      <p:childTnLst>
-                        <p:par>
-                          <p:cTn id="11" fill="hold">
-                            <p:stCondLst>
-                              <p:cond delay="0"/>
-                            </p:stCondLst>
-                            <p:childTnLst>
-                              <p:par>
-                                <p:cTn id="12" presetID="42" presetClass="entr" presetSubtype="0" fill="hold" nodeType="clickEffect">
-                                  <p:stCondLst>
-                                    <p:cond delay="0"/>
-                                  </p:stCondLst>
-                                  <p:childTnLst>
-                                    <p:set>
-                                      <p:cBhvr>
-                                        <p:cTn id="13" dur="1" fill="hold">
-                                          <p:stCondLst>
-                                            <p:cond delay="0"/>
-                                          </p:stCondLst>
-                                        </p:cTn>
-                                        <p:tgtEl>
-                                          <p:spTgt spid="12">
-                                            <p:txEl>
-                                              <p:pRg st="1" end="1"/>
-                                            </p:txEl>
-                                          </p:spTgt>
-                                        </p:tgtEl>
-                                        <p:attrNameLst>
-                                          <p:attrName>style.visibility</p:attrName>
-                                        </p:attrNameLst>
-                                      </p:cBhvr>
-                                      <p:to>
-                                        <p:strVal val="visible"/>
-                                      </p:to>
-                                    </p:set>
-                                    <p:animEffect transition="in" filter="fade">
-                                      <p:cBhvr>
-                                        <p:cTn id="14" dur="1000"/>
-                                        <p:tgtEl>
-                                          <p:spTgt spid="12">
-                                            <p:txEl>
-                                              <p:pRg st="1" end="1"/>
-                                            </p:txEl>
-                                          </p:spTgt>
-                                        </p:tgtEl>
-                                      </p:cBhvr>
-                                    </p:animEffect>
-                                    <p:anim calcmode="lin" valueType="num">
-                                      <p:cBhvr>
-                                        <p:cTn id="15" dur="1000" fill="hold"/>
-                                        <p:tgtEl>
-                                          <p:spTgt spid="12">
-                                            <p:txEl>
-                                              <p:pRg st="1" end="1"/>
-                                            </p:txEl>
-                                          </p:spTgt>
-                                        </p:tgtEl>
-                                        <p:attrNameLst>
-                                          <p:attrName>ppt_x</p:attrName>
-                                        </p:attrNameLst>
-                                      </p:cBhvr>
-                                      <p:tavLst>
-                                        <p:tav tm="0">
-                                          <p:val>
-                                            <p:strVal val="#ppt_x"/>
-                                          </p:val>
-                                        </p:tav>
-                                        <p:tav tm="100000">
-                                          <p:val>
-                                            <p:strVal val="#ppt_x"/>
-                                          </p:val>
-                                        </p:tav>
-                                      </p:tavLst>
-                                    </p:anim>
-                                    <p:anim calcmode="lin" valueType="num">
-                                      <p:cBhvr>
-                                        <p:cTn id="16" dur="1000" fill="hold"/>
-                                        <p:tgtEl>
-                                          <p:spTgt spid="12">
-                                            <p:txEl>
-                                              <p:pRg st="1" end="1"/>
-                                            </p:txEl>
-                                          </p:spTgt>
-                                        </p:tgtEl>
-                                        <p:attrNameLst>
-                                          <p:attrName>ppt_y</p:attrName>
-                                        </p:attrNameLst>
-                                      </p:cBhvr>
-                                      <p:tavLst>
-                                        <p:tav tm="0">
-                                          <p:val>
-                                            <p:strVal val="#ppt_y+.1"/>
-                                          </p:val>
-                                        </p:tav>
-                                        <p:tav tm="100000">
-                                          <p:val>
-                                            <p:strVal val="#ppt_y"/>
-                                          </p:val>
-                                        </p:tav>
-                                      </p:tavLst>
-                                    </p:anim>
-                                  </p:childTnLst>
-                                </p:cTn>
-                              </p:par>
-                            </p:childTnLst>
-                          </p:cTn>
-                        </p:par>
-                      </p:childTnLst>
-                    </p:cTn>
-                  </p:par>
-                </p:childTnLst>
-              </p:cTn>
-              <p:prevCondLst>
-                <p:cond evt="onPrev" delay="0">
-                  <p:tgtEl>
-                    <p:sldTgt/>
-                  </p:tgtEl>
-                </p:cond>
-              </p:prevCondLst>
-              <p:nextCondLst>
-                <p:cond evt="onNext" delay="0">
-                  <p:tgtEl>
-                    <p:sldTgt/>
-                  </p:tgtEl>
-                </p:cond>
-              </p:nextCondLst>
-            </p:seq>
-          </p:childTnLst>
-        </p:cTn>
-      </p:par>
-    </p:tnLst>
-  </p:timing>
 </p:sld>
 </file>
 
@@ -13642,10 +14007,10 @@
       </p:grpSpPr>
       <p:sp>
         <p:nvSpPr>
-          <p:cNvPr id="3" name="Content Placeholder 2">
+          <p:cNvPr id="2" name="Title 1">
             <a:extLst>
               <a:ext uri="{FF2B5EF4-FFF2-40B4-BE49-F238E27FC236}">
-                <a16:creationId xmlns:a16="http://schemas.microsoft.com/office/drawing/2014/main" id="{32B86DBA-27DF-4A90-A6B6-700AC8D4BE2D}"/>
+                <a16:creationId xmlns:a16="http://schemas.microsoft.com/office/drawing/2014/main" id="{51B845D4-9045-43CF-90C4-F2AC7A85FEB3}"/>
               </a:ext>
             </a:extLst>
           </p:cNvPr>
@@ -13653,13 +14018,13 @@
             <a:spLocks noGrp="1"/>
           </p:cNvSpPr>
           <p:nvPr>
-            <p:ph idx="1"/>
+            <p:ph type="title"/>
           </p:nvPr>
         </p:nvSpPr>
         <p:spPr>
           <a:xfrm>
-            <a:off x="1741013" y="1520048"/>
-            <a:ext cx="7886700" cy="3263504"/>
+            <a:off x="508001" y="322729"/>
+            <a:ext cx="6447501" cy="990600"/>
           </a:xfrm>
         </p:spPr>
         <p:txBody>
@@ -13668,29 +14033,51 @@
           </a:bodyPr>
           <a:lstStyle/>
           <a:p>
-            <a:pPr marL="0" indent="0">
-              <a:buNone/>
-            </a:pPr>
             <a:r>
-              <a:rPr lang="en-IN" sz="6000" dirty="0"/>
-              <a:t>What’s Next?</a:t>
-            </a:r>
-          </a:p>
-          <a:p>
-            <a:pPr marL="0" indent="0">
-              <a:buNone/>
-            </a:pPr>
-            <a:r>
-              <a:rPr lang="en-IN" sz="6000" dirty="0"/>
-              <a:t>Do some Hands-On</a:t>
+              <a:rPr lang="en-US" sz="4000" dirty="0">
+                <a:solidFill>
+                  <a:schemeClr val="tx1"/>
+                </a:solidFill>
+              </a:rPr>
+              <a:t>				Git Workflow</a:t>
             </a:r>
           </a:p>
         </p:txBody>
       </p:sp>
+      <p:pic>
+        <p:nvPicPr>
+          <p:cNvPr id="5" name="Picture 4">
+            <a:extLst>
+              <a:ext uri="{FF2B5EF4-FFF2-40B4-BE49-F238E27FC236}">
+                <a16:creationId xmlns:a16="http://schemas.microsoft.com/office/drawing/2014/main" id="{86F99364-22A2-4142-A17E-40228BE4AD5F}"/>
+              </a:ext>
+            </a:extLst>
+          </p:cNvPr>
+          <p:cNvPicPr>
+            <a:picLocks noChangeAspect="1"/>
+          </p:cNvPicPr>
+          <p:nvPr/>
+        </p:nvPicPr>
+        <p:blipFill>
+          <a:blip r:embed="rId2"/>
+          <a:stretch>
+            <a:fillRect/>
+          </a:stretch>
+        </p:blipFill>
+        <p:spPr>
+          <a:xfrm>
+            <a:off x="352973" y="1109732"/>
+            <a:ext cx="7513555" cy="3868365"/>
+          </a:xfrm>
+          <a:prstGeom prst="rect">
+            <a:avLst/>
+          </a:prstGeom>
+        </p:spPr>
+      </p:pic>
     </p:spTree>
     <p:extLst>
       <p:ext uri="{BB962C8B-B14F-4D97-AF65-F5344CB8AC3E}">
-        <p14:creationId xmlns:p14="http://schemas.microsoft.com/office/powerpoint/2010/main" val="3863471975"/>
+        <p14:creationId xmlns:p14="http://schemas.microsoft.com/office/powerpoint/2010/main" val="629343764"/>
       </p:ext>
     </p:extLst>
   </p:cSld>
@@ -13731,10 +14118,10 @@
       </p:grpSpPr>
       <p:sp>
         <p:nvSpPr>
-          <p:cNvPr id="6" name="Title 1">
+          <p:cNvPr id="2" name="Title 1">
             <a:extLst>
               <a:ext uri="{FF2B5EF4-FFF2-40B4-BE49-F238E27FC236}">
-                <a16:creationId xmlns:a16="http://schemas.microsoft.com/office/drawing/2014/main" id="{5B7C5DBC-83A1-4533-99CF-E7AC797BBCF3}"/>
+                <a16:creationId xmlns:a16="http://schemas.microsoft.com/office/drawing/2014/main" id="{A7909E01-7799-401D-8035-11B028225FFB}"/>
               </a:ext>
             </a:extLst>
           </p:cNvPr>
@@ -13745,151 +14132,48 @@
             <p:ph type="title"/>
           </p:nvPr>
         </p:nvSpPr>
-        <p:spPr>
-          <a:xfrm>
-            <a:off x="411996" y="0"/>
-            <a:ext cx="7886700" cy="994172"/>
-          </a:xfrm>
-        </p:spPr>
+        <p:spPr/>
         <p:txBody>
-          <a:bodyPr/>
+          <a:bodyPr>
+            <a:normAutofit/>
+          </a:bodyPr>
           <a:lstStyle/>
           <a:p>
             <a:r>
-              <a:rPr lang="en-US" dirty="0">
+              <a:rPr lang="en-US" sz="4400" dirty="0">
                 <a:solidFill>
                   <a:schemeClr val="tx1"/>
                 </a:solidFill>
               </a:rPr>
-              <a:t>Go to Github.com</a:t>
+              <a:t>					Git Branch</a:t>
             </a:r>
-          </a:p>
-        </p:txBody>
-      </p:sp>
-      <p:sp>
-        <p:nvSpPr>
-          <p:cNvPr id="9" name="Rectangle 8">
-            <a:extLst>
-              <a:ext uri="{FF2B5EF4-FFF2-40B4-BE49-F238E27FC236}">
-                <a16:creationId xmlns:a16="http://schemas.microsoft.com/office/drawing/2014/main" id="{FAD04910-4844-4CF3-9311-C708C44EB733}"/>
-              </a:ext>
-            </a:extLst>
-          </p:cNvPr>
-          <p:cNvSpPr/>
-          <p:nvPr/>
-        </p:nvSpPr>
-        <p:spPr>
-          <a:xfrm>
-            <a:off x="127591" y="4699591"/>
-            <a:ext cx="2541181" cy="329609"/>
-          </a:xfrm>
-          <a:prstGeom prst="rect">
-            <a:avLst/>
-          </a:prstGeom>
-          <a:solidFill>
-            <a:schemeClr val="bg1"/>
-          </a:solidFill>
-          <a:ln>
-            <a:noFill/>
-          </a:ln>
-        </p:spPr>
-        <p:style>
-          <a:lnRef idx="2">
-            <a:schemeClr val="accent6"/>
-          </a:lnRef>
-          <a:fillRef idx="1">
-            <a:schemeClr val="lt1"/>
-          </a:fillRef>
-          <a:effectRef idx="0">
-            <a:schemeClr val="accent6"/>
-          </a:effectRef>
-          <a:fontRef idx="minor">
-            <a:schemeClr val="dk1"/>
-          </a:fontRef>
-        </p:style>
-        <p:txBody>
-          <a:bodyPr rtlCol="0" anchor="ctr"/>
-          <a:lstStyle/>
-          <a:p>
-            <a:pPr algn="ctr"/>
-            <a:endParaRPr lang="en-IN"/>
-          </a:p>
-        </p:txBody>
-      </p:sp>
-      <p:sp>
-        <p:nvSpPr>
-          <p:cNvPr id="10" name="Rectangle 9">
-            <a:extLst>
-              <a:ext uri="{FF2B5EF4-FFF2-40B4-BE49-F238E27FC236}">
-                <a16:creationId xmlns:a16="http://schemas.microsoft.com/office/drawing/2014/main" id="{2081E9AD-4EBA-4180-A02B-7344808D8989}"/>
-              </a:ext>
-            </a:extLst>
-          </p:cNvPr>
-          <p:cNvSpPr/>
-          <p:nvPr/>
-        </p:nvSpPr>
-        <p:spPr>
-          <a:xfrm>
-            <a:off x="6602819" y="4699591"/>
-            <a:ext cx="2541181" cy="329609"/>
-          </a:xfrm>
-          <a:prstGeom prst="rect">
-            <a:avLst/>
-          </a:prstGeom>
-          <a:solidFill>
-            <a:schemeClr val="bg1"/>
-          </a:solidFill>
-          <a:ln>
-            <a:noFill/>
-          </a:ln>
-        </p:spPr>
-        <p:style>
-          <a:lnRef idx="2">
-            <a:schemeClr val="accent6"/>
-          </a:lnRef>
-          <a:fillRef idx="1">
-            <a:schemeClr val="lt1"/>
-          </a:fillRef>
-          <a:effectRef idx="0">
-            <a:schemeClr val="accent6"/>
-          </a:effectRef>
-          <a:fontRef idx="minor">
-            <a:schemeClr val="dk1"/>
-          </a:fontRef>
-        </p:style>
-        <p:txBody>
-          <a:bodyPr rtlCol="0" anchor="ctr"/>
-          <a:lstStyle/>
-          <a:p>
-            <a:pPr algn="ctr"/>
-            <a:endParaRPr lang="en-IN"/>
           </a:p>
         </p:txBody>
       </p:sp>
       <p:pic>
         <p:nvPicPr>
-          <p:cNvPr id="3" name="Picture 2"/>
+          <p:cNvPr id="7" name="Picture 6">
+            <a:extLst>
+              <a:ext uri="{FF2B5EF4-FFF2-40B4-BE49-F238E27FC236}">
+                <a16:creationId xmlns:a16="http://schemas.microsoft.com/office/drawing/2014/main" id="{C1A8A446-91A5-4F56-8D36-5DDCCB0CB022}"/>
+              </a:ext>
+            </a:extLst>
+          </p:cNvPr>
           <p:cNvPicPr>
             <a:picLocks noChangeAspect="1"/>
           </p:cNvPicPr>
           <p:nvPr/>
         </p:nvPicPr>
         <p:blipFill>
-          <a:blip r:embed="rId2">
-            <a:extLst>
-              <a:ext uri="{28A0092B-C50C-407E-A947-70E740481C1C}">
-                <a14:useLocalDpi xmlns:a14="http://schemas.microsoft.com/office/drawing/2010/main" val="0"/>
-              </a:ext>
-            </a:extLst>
-          </a:blip>
+          <a:blip r:embed="rId2"/>
           <a:stretch>
             <a:fillRect/>
           </a:stretch>
         </p:blipFill>
         <p:spPr>
           <a:xfrm>
-            <a:off x="0" y="637952"/>
-            <a:ext cx="9144000" cy="4505548"/>
+            <a:off x="639928" y="1279711"/>
+            <a:ext cx="6177731" cy="3165449"/>
           </a:xfrm>
           <a:prstGeom prst="rect">
             <a:avLst/>
@@ -13899,7 +14183,7 @@
     </p:spTree>
     <p:extLst>
       <p:ext uri="{BB962C8B-B14F-4D97-AF65-F5344CB8AC3E}">
-        <p14:creationId xmlns:p14="http://schemas.microsoft.com/office/powerpoint/2010/main" val="1267898955"/>
+        <p14:creationId xmlns:p14="http://schemas.microsoft.com/office/powerpoint/2010/main" val="2945831224"/>
       </p:ext>
     </p:extLst>
   </p:cSld>
@@ -14644,18 +14928,18 @@
 </file>
 
 <file path=customXml/item2.xml><?xml version="1.0" encoding="utf-8"?>
-<p:properties xmlns:p="http://schemas.microsoft.com/office/2006/metadata/properties" xmlns:xsi="http://www.w3.org/2001/XMLSchema-instance" xmlns:pc="http://schemas.microsoft.com/office/infopath/2007/PartnerControls">
-  <documentManagement/>
-</p:properties>
-</file>
-
-<file path=customXml/item3.xml><?xml version="1.0" encoding="utf-8"?>
 <?mso-contentType ?>
 <FormTemplates xmlns="http://schemas.microsoft.com/sharepoint/v3/contenttype/forms">
   <Display>DocumentLibraryForm</Display>
   <Edit>DocumentLibraryForm</Edit>
   <New>DocumentLibraryForm</New>
 </FormTemplates>
+</file>
+
+<file path=customXml/item3.xml><?xml version="1.0" encoding="utf-8"?>
+<p:properties xmlns:p="http://schemas.microsoft.com/office/2006/metadata/properties" xmlns:xsi="http://www.w3.org/2001/XMLSchema-instance" xmlns:pc="http://schemas.microsoft.com/office/infopath/2007/PartnerControls">
+  <documentManagement/>
+</p:properties>
 </file>
 
 <file path=customXml/itemProps1.xml><?xml version="1.0" encoding="utf-8"?>
@@ -14677,6 +14961,14 @@
 </file>
 
 <file path=customXml/itemProps2.xml><?xml version="1.0" encoding="utf-8"?>
+<ds:datastoreItem xmlns:ds="http://schemas.openxmlformats.org/officeDocument/2006/customXml" ds:itemID="{A681D2DF-F93E-4CC1-8A50-704C6CA0430E}">
+  <ds:schemaRefs>
+    <ds:schemaRef ds:uri="http://schemas.microsoft.com/sharepoint/v3/contenttype/forms"/>
+  </ds:schemaRefs>
+</ds:datastoreItem>
+</file>
+
+<file path=customXml/itemProps3.xml><?xml version="1.0" encoding="utf-8"?>
 <ds:datastoreItem xmlns:ds="http://schemas.openxmlformats.org/officeDocument/2006/customXml" ds:itemID="{7EF52303-DD41-4871-8221-5749C8E3EEE6}">
   <ds:schemaRefs>
     <ds:schemaRef ds:uri="http://purl.org/dc/elements/1.1/"/>
@@ -14691,12 +14983,4 @@
     <ds:schemaRef ds:uri="http://www.w3.org/XML/1998/namespace"/>
   </ds:schemaRefs>
 </ds:datastoreItem>
-</file>
-
-<file path=customXml/itemProps3.xml><?xml version="1.0" encoding="utf-8"?>
-<ds:datastoreItem xmlns:ds="http://schemas.openxmlformats.org/officeDocument/2006/customXml" ds:itemID="{A681D2DF-F93E-4CC1-8A50-704C6CA0430E}">
-  <ds:schemaRefs>
-    <ds:schemaRef ds:uri="http://schemas.microsoft.com/sharepoint/v3/contenttype/forms"/>
-  </ds:schemaRefs>
-</ds:datastoreItem>
 </file>
</xml_diff>